<commit_message>
Updated 08 slides on border security with l7 and architecture
</commit_message>
<xml_diff>
--- a/slides/08 Border Security.pptx
+++ b/slides/08 Border Security.pptx
@@ -5,7 +5,7 @@
     <p:sldMasterId id="2147483696" r:id="rId1"/>
   </p:sldMasterIdLst>
   <p:notesMasterIdLst>
-    <p:notesMasterId r:id="rId32"/>
+    <p:notesMasterId r:id="rId48"/>
   </p:notesMasterIdLst>
   <p:sldIdLst>
     <p:sldId id="256" r:id="rId2"/>
@@ -38,6 +38,22 @@
     <p:sldId id="283" r:id="rId29"/>
     <p:sldId id="284" r:id="rId30"/>
     <p:sldId id="285" r:id="rId31"/>
+    <p:sldId id="286" r:id="rId32"/>
+    <p:sldId id="287" r:id="rId33"/>
+    <p:sldId id="289" r:id="rId34"/>
+    <p:sldId id="290" r:id="rId35"/>
+    <p:sldId id="291" r:id="rId36"/>
+    <p:sldId id="292" r:id="rId37"/>
+    <p:sldId id="293" r:id="rId38"/>
+    <p:sldId id="303" r:id="rId39"/>
+    <p:sldId id="304" r:id="rId40"/>
+    <p:sldId id="305" r:id="rId41"/>
+    <p:sldId id="306" r:id="rId42"/>
+    <p:sldId id="307" r:id="rId43"/>
+    <p:sldId id="308" r:id="rId44"/>
+    <p:sldId id="309" r:id="rId45"/>
+    <p:sldId id="310" r:id="rId46"/>
+    <p:sldId id="311" r:id="rId47"/>
   </p:sldIdLst>
   <p:sldSz cx="12192000" cy="6858000"/>
   <p:notesSz cx="6858000" cy="9144000"/>
@@ -226,7 +242,7 @@
           <a:p>
             <a:fld id="{CB1FC78A-4701-4AB1-BCE7-59EF109C5124}" type="datetimeFigureOut">
               <a:rPr lang="en-US" smtClean="0"/>
-              <a:t>3/11/2019</a:t>
+              <a:t>3/13/2019</a:t>
             </a:fld>
             <a:endParaRPr lang="en-US"/>
           </a:p>
@@ -656,7 +672,7 @@
           <a:p>
             <a:fld id="{1160EA64-D806-43AC-9DF2-F8C432F32B4C}" type="datetimeFigureOut">
               <a:rPr lang="en-US" dirty="0"/>
-              <a:t>3/11/2019</a:t>
+              <a:t>3/13/2019</a:t>
             </a:fld>
             <a:endParaRPr lang="en-US" dirty="0"/>
           </a:p>
@@ -822,7 +838,7 @@
           <a:p>
             <a:fld id="{E9F9C37B-1D36-470B-8223-D6C91242EC14}" type="datetimeFigureOut">
               <a:rPr lang="en-US" dirty="0"/>
-              <a:t>3/11/2019</a:t>
+              <a:t>3/13/2019</a:t>
             </a:fld>
             <a:endParaRPr lang="en-US" dirty="0"/>
           </a:p>
@@ -997,7 +1013,7 @@
           <a:p>
             <a:fld id="{67C6F52A-A82B-47A2-A83A-8C4C91F2D59F}" type="datetimeFigureOut">
               <a:rPr lang="en-US" dirty="0"/>
-              <a:t>3/11/2019</a:t>
+              <a:t>3/13/2019</a:t>
             </a:fld>
             <a:endParaRPr lang="en-US" dirty="0"/>
           </a:p>
@@ -1046,6 +1062,186 @@
         </p:txBody>
       </p:sp>
     </p:spTree>
+  </p:cSld>
+  <p:clrMapOvr>
+    <a:masterClrMapping/>
+  </p:clrMapOvr>
+</p:sldLayout>
+</file>
+
+<file path=ppt/slideLayouts/slideLayout12.xml><?xml version="1.0" encoding="utf-8"?>
+<p:sldLayout xmlns:a="http://schemas.openxmlformats.org/drawingml/2006/main" xmlns:r="http://schemas.openxmlformats.org/officeDocument/2006/relationships" xmlns:p="http://schemas.openxmlformats.org/presentationml/2006/main" type="obj">
+  <p:cSld name="1_Title and Content">
+    <p:spTree>
+      <p:nvGrpSpPr>
+        <p:cNvPr id="1" name=""/>
+        <p:cNvGrpSpPr/>
+        <p:nvPr/>
+      </p:nvGrpSpPr>
+      <p:grpSpPr>
+        <a:xfrm>
+          <a:off x="0" y="0"/>
+          <a:ext cx="0" cy="0"/>
+          <a:chOff x="0" y="0"/>
+          <a:chExt cx="0" cy="0"/>
+        </a:xfrm>
+      </p:grpSpPr>
+      <p:sp>
+        <p:nvSpPr>
+          <p:cNvPr id="2" name="Title 1"/>
+          <p:cNvSpPr>
+            <a:spLocks noGrp="1"/>
+          </p:cNvSpPr>
+          <p:nvPr>
+            <p:ph type="title"/>
+          </p:nvPr>
+        </p:nvSpPr>
+        <p:spPr>
+          <a:xfrm>
+            <a:off x="812800" y="274638"/>
+            <a:ext cx="10566400" cy="1143000"/>
+          </a:xfrm>
+        </p:spPr>
+        <p:txBody>
+          <a:bodyPr/>
+          <a:lstStyle/>
+          <a:p>
+            <a:r>
+              <a:rPr lang="en-US"/>
+              <a:t>Click to edit Master title style</a:t>
+            </a:r>
+            <a:endParaRPr lang="en-US" dirty="0"/>
+          </a:p>
+        </p:txBody>
+      </p:sp>
+      <p:sp>
+        <p:nvSpPr>
+          <p:cNvPr id="4" name="Date Placeholder 3"/>
+          <p:cNvSpPr>
+            <a:spLocks noGrp="1"/>
+          </p:cNvSpPr>
+          <p:nvPr>
+            <p:ph type="dt" sz="half" idx="10"/>
+          </p:nvPr>
+        </p:nvSpPr>
+        <p:spPr/>
+        <p:txBody>
+          <a:bodyPr/>
+          <a:lstStyle/>
+          <a:p>
+            <a:fld id="{6CB03EA0-2F37-4F62-93D1-61BCD1BEDED7}" type="datetimeFigureOut">
+              <a:rPr lang="en-US" smtClean="0"/>
+              <a:t>3/13/2019</a:t>
+            </a:fld>
+            <a:endParaRPr lang="en-US"/>
+          </a:p>
+        </p:txBody>
+      </p:sp>
+      <p:sp>
+        <p:nvSpPr>
+          <p:cNvPr id="5" name="Footer Placeholder 4"/>
+          <p:cNvSpPr>
+            <a:spLocks noGrp="1"/>
+          </p:cNvSpPr>
+          <p:nvPr>
+            <p:ph type="ftr" sz="quarter" idx="11"/>
+          </p:nvPr>
+        </p:nvSpPr>
+        <p:spPr/>
+        <p:txBody>
+          <a:bodyPr/>
+          <a:lstStyle/>
+          <a:p>
+            <a:endParaRPr lang="en-US"/>
+          </a:p>
+        </p:txBody>
+      </p:sp>
+      <p:sp>
+        <p:nvSpPr>
+          <p:cNvPr id="6" name="Slide Number Placeholder 5"/>
+          <p:cNvSpPr>
+            <a:spLocks noGrp="1"/>
+          </p:cNvSpPr>
+          <p:nvPr>
+            <p:ph type="sldNum" sz="quarter" idx="12"/>
+          </p:nvPr>
+        </p:nvSpPr>
+        <p:spPr/>
+        <p:txBody>
+          <a:bodyPr/>
+          <a:lstStyle/>
+          <a:p>
+            <a:fld id="{75ECBC2B-047C-4DA3-A87D-9C137F3EDB9B}" type="slidenum">
+              <a:rPr lang="en-US" smtClean="0"/>
+              <a:t>‹#›</a:t>
+            </a:fld>
+            <a:endParaRPr lang="en-US"/>
+          </a:p>
+        </p:txBody>
+      </p:sp>
+      <p:sp>
+        <p:nvSpPr>
+          <p:cNvPr id="8" name="Content Placeholder 7"/>
+          <p:cNvSpPr>
+            <a:spLocks noGrp="1"/>
+          </p:cNvSpPr>
+          <p:nvPr>
+            <p:ph sz="quarter" idx="13"/>
+          </p:nvPr>
+        </p:nvSpPr>
+        <p:spPr>
+          <a:xfrm>
+            <a:off x="812800" y="1600200"/>
+            <a:ext cx="10566400" cy="4114800"/>
+          </a:xfrm>
+        </p:spPr>
+        <p:txBody>
+          <a:bodyPr/>
+          <a:lstStyle/>
+          <a:p>
+            <a:pPr lvl="0"/>
+            <a:r>
+              <a:rPr lang="en-US"/>
+              <a:t>Click to edit Master text styles</a:t>
+            </a:r>
+          </a:p>
+          <a:p>
+            <a:pPr lvl="1"/>
+            <a:r>
+              <a:rPr lang="en-US"/>
+              <a:t>Second level</a:t>
+            </a:r>
+          </a:p>
+          <a:p>
+            <a:pPr lvl="2"/>
+            <a:r>
+              <a:rPr lang="en-US"/>
+              <a:t>Third level</a:t>
+            </a:r>
+          </a:p>
+          <a:p>
+            <a:pPr lvl="3"/>
+            <a:r>
+              <a:rPr lang="en-US"/>
+              <a:t>Fourth level</a:t>
+            </a:r>
+          </a:p>
+          <a:p>
+            <a:pPr lvl="4"/>
+            <a:r>
+              <a:rPr lang="en-US"/>
+              <a:t>Fifth level</a:t>
+            </a:r>
+            <a:endParaRPr lang="en-US" dirty="0"/>
+          </a:p>
+        </p:txBody>
+      </p:sp>
+    </p:spTree>
+    <p:extLst>
+      <p:ext uri="{BB962C8B-B14F-4D97-AF65-F5344CB8AC3E}">
+        <p14:creationId xmlns:p14="http://schemas.microsoft.com/office/powerpoint/2010/main" val="3713302079"/>
+      </p:ext>
+    </p:extLst>
   </p:cSld>
   <p:clrMapOvr>
     <a:masterClrMapping/>
@@ -1162,7 +1358,7 @@
           <a:p>
             <a:fld id="{F070A7B3-6521-4DCA-87E5-044747A908C1}" type="datetimeFigureOut">
               <a:rPr lang="en-US" dirty="0"/>
-              <a:t>3/11/2019</a:t>
+              <a:t>3/13/2019</a:t>
             </a:fld>
             <a:endParaRPr lang="en-US" dirty="0"/>
           </a:p>
@@ -1426,7 +1622,7 @@
           <a:p>
             <a:fld id="{1160EA64-D806-43AC-9DF2-F8C432F32B4C}" type="datetimeFigureOut">
               <a:rPr lang="en-US" dirty="0"/>
-              <a:t>3/11/2019</a:t>
+              <a:t>3/13/2019</a:t>
             </a:fld>
             <a:endParaRPr lang="en-US" dirty="0"/>
           </a:p>
@@ -1654,7 +1850,7 @@
           <a:p>
             <a:fld id="{AB134690-1557-4C89-A502-4959FE7FAD70}" type="datetimeFigureOut">
               <a:rPr lang="en-US" dirty="0"/>
-              <a:t>3/11/2019</a:t>
+              <a:t>3/13/2019</a:t>
             </a:fld>
             <a:endParaRPr lang="en-US" dirty="0"/>
           </a:p>
@@ -2008,7 +2204,7 @@
           <a:p>
             <a:fld id="{4F7D4976-E339-4826-83B7-FBD03F55ECF8}" type="datetimeFigureOut">
               <a:rPr lang="en-US" dirty="0"/>
-              <a:t>3/11/2019</a:t>
+              <a:t>3/13/2019</a:t>
             </a:fld>
             <a:endParaRPr lang="en-US" dirty="0"/>
           </a:p>
@@ -2144,7 +2340,7 @@
           <a:p>
             <a:fld id="{E1037C31-9E7A-4F99-8774-A0E530DE1A42}" type="datetimeFigureOut">
               <a:rPr lang="en-US" dirty="0"/>
-              <a:t>3/11/2019</a:t>
+              <a:t>3/13/2019</a:t>
             </a:fld>
             <a:endParaRPr lang="en-US" dirty="0"/>
           </a:p>
@@ -2234,7 +2430,7 @@
           <a:p>
             <a:fld id="{C278504F-A551-4DE0-9316-4DCD1D8CC752}" type="datetimeFigureOut">
               <a:rPr lang="en-US" dirty="0"/>
-              <a:t>3/11/2019</a:t>
+              <a:t>3/13/2019</a:t>
             </a:fld>
             <a:endParaRPr lang="en-US" dirty="0"/>
           </a:p>
@@ -2586,7 +2782,7 @@
           <a:p>
             <a:fld id="{D1BE4249-C0D0-4B06-8692-E8BB871AF643}" type="datetimeFigureOut">
               <a:rPr lang="en-US" dirty="0"/>
-              <a:t>3/11/2019</a:t>
+              <a:t>3/13/2019</a:t>
             </a:fld>
             <a:endParaRPr lang="en-US" dirty="0"/>
           </a:p>
@@ -2938,7 +3134,7 @@
           <a:p>
             <a:fld id="{042B0DB6-F5C7-45FB-8CF3-31B45F9C2DAC}" type="datetimeFigureOut">
               <a:rPr lang="en-US" dirty="0"/>
-              <a:t>3/11/2019</a:t>
+              <a:t>3/13/2019</a:t>
             </a:fld>
             <a:endParaRPr lang="en-US" dirty="0"/>
           </a:p>
@@ -3174,7 +3370,7 @@
           <a:p>
             <a:fld id="{1160EA64-D806-43AC-9DF2-F8C432F32B4C}" type="datetimeFigureOut">
               <a:rPr lang="en-US" dirty="0"/>
-              <a:t>3/11/2019</a:t>
+              <a:t>3/13/2019</a:t>
             </a:fld>
             <a:endParaRPr lang="en-US" dirty="0"/>
           </a:p>
@@ -3279,6 +3475,7 @@
     <p:sldLayoutId id="2147483705" r:id="rId9"/>
     <p:sldLayoutId id="2147483706" r:id="rId10"/>
     <p:sldLayoutId id="2147483707" r:id="rId11"/>
+    <p:sldLayoutId id="2147483708" r:id="rId12"/>
   </p:sldLayoutIdLst>
   <p:hf sldNum="0" hdr="0" ftr="0" dt="0"/>
   <p:txStyles>
@@ -7304,6 +7501,1796 @@
 </p:sld>
 </file>
 
+<file path=ppt/slides/slide31.xml><?xml version="1.0" encoding="utf-8"?>
+<p:sld xmlns:a="http://schemas.openxmlformats.org/drawingml/2006/main" xmlns:r="http://schemas.openxmlformats.org/officeDocument/2006/relationships" xmlns:p="http://schemas.openxmlformats.org/presentationml/2006/main">
+  <p:cSld>
+    <p:spTree>
+      <p:nvGrpSpPr>
+        <p:cNvPr id="1" name=""/>
+        <p:cNvGrpSpPr/>
+        <p:nvPr/>
+      </p:nvGrpSpPr>
+      <p:grpSpPr>
+        <a:xfrm>
+          <a:off x="0" y="0"/>
+          <a:ext cx="0" cy="0"/>
+          <a:chOff x="0" y="0"/>
+          <a:chExt cx="0" cy="0"/>
+        </a:xfrm>
+      </p:grpSpPr>
+      <p:sp>
+        <p:nvSpPr>
+          <p:cNvPr id="2" name="Title 1">
+            <a:extLst>
+              <a:ext uri="{FF2B5EF4-FFF2-40B4-BE49-F238E27FC236}">
+                <a16:creationId xmlns:a16="http://schemas.microsoft.com/office/drawing/2014/main" id="{A01E5D17-6773-4A97-8E43-EB93B8D47260}"/>
+              </a:ext>
+            </a:extLst>
+          </p:cNvPr>
+          <p:cNvSpPr>
+            <a:spLocks noGrp="1"/>
+          </p:cNvSpPr>
+          <p:nvPr>
+            <p:ph type="title"/>
+          </p:nvPr>
+        </p:nvSpPr>
+        <p:spPr/>
+        <p:txBody>
+          <a:bodyPr/>
+          <a:lstStyle/>
+          <a:p>
+            <a:r>
+              <a:rPr lang="en-US" dirty="0"/>
+              <a:t>Early Motivations for L7</a:t>
+            </a:r>
+          </a:p>
+        </p:txBody>
+      </p:sp>
+      <p:sp>
+        <p:nvSpPr>
+          <p:cNvPr id="3" name="Content Placeholder 2">
+            <a:extLst>
+              <a:ext uri="{FF2B5EF4-FFF2-40B4-BE49-F238E27FC236}">
+                <a16:creationId xmlns:a16="http://schemas.microsoft.com/office/drawing/2014/main" id="{34C6CA1B-9CAF-43D2-9462-97156787FE51}"/>
+              </a:ext>
+            </a:extLst>
+          </p:cNvPr>
+          <p:cNvSpPr>
+            <a:spLocks noGrp="1"/>
+          </p:cNvSpPr>
+          <p:nvPr>
+            <p:ph idx="1"/>
+          </p:nvPr>
+        </p:nvSpPr>
+        <p:spPr/>
+        <p:txBody>
+          <a:bodyPr/>
+          <a:lstStyle/>
+          <a:p>
+            <a:r>
+              <a:rPr lang="en-US" dirty="0"/>
+              <a:t>Application firewalls go back to 1991!!</a:t>
+            </a:r>
+          </a:p>
+          <a:p>
+            <a:r>
+              <a:rPr lang="en-US" dirty="0"/>
+              <a:t>The idea was simple: Firewalls should understand application traffic.</a:t>
+            </a:r>
+          </a:p>
+          <a:p>
+            <a:r>
+              <a:rPr lang="en-US" dirty="0"/>
+              <a:t>Example: FTP</a:t>
+            </a:r>
+          </a:p>
+          <a:p>
+            <a:pPr lvl="1"/>
+            <a:r>
+              <a:rPr lang="en-US" dirty="0"/>
+              <a:t>FTP has a control channel and a bulk data channel</a:t>
+            </a:r>
+          </a:p>
+          <a:p>
+            <a:pPr lvl="1"/>
+            <a:r>
+              <a:rPr lang="en-US" dirty="0"/>
+              <a:t>To transfer a file, a new port is opened dynamically, and communicated over control</a:t>
+            </a:r>
+          </a:p>
+          <a:p>
+            <a:pPr lvl="1"/>
+            <a:r>
+              <a:rPr lang="en-US" dirty="0"/>
+              <a:t>Even if FTP’s control channel port is open, how do you open the dynamic port?</a:t>
+            </a:r>
+          </a:p>
+        </p:txBody>
+      </p:sp>
+    </p:spTree>
+    <p:extLst>
+      <p:ext uri="{BB962C8B-B14F-4D97-AF65-F5344CB8AC3E}">
+        <p14:creationId xmlns:p14="http://schemas.microsoft.com/office/powerpoint/2010/main" val="1419622137"/>
+      </p:ext>
+    </p:extLst>
+  </p:cSld>
+  <p:clrMapOvr>
+    <a:masterClrMapping/>
+  </p:clrMapOvr>
+</p:sld>
+</file>
+
+<file path=ppt/slides/slide32.xml><?xml version="1.0" encoding="utf-8"?>
+<p:sld xmlns:a="http://schemas.openxmlformats.org/drawingml/2006/main" xmlns:r="http://schemas.openxmlformats.org/officeDocument/2006/relationships" xmlns:p="http://schemas.openxmlformats.org/presentationml/2006/main">
+  <p:cSld>
+    <p:spTree>
+      <p:nvGrpSpPr>
+        <p:cNvPr id="1" name=""/>
+        <p:cNvGrpSpPr/>
+        <p:nvPr/>
+      </p:nvGrpSpPr>
+      <p:grpSpPr>
+        <a:xfrm>
+          <a:off x="0" y="0"/>
+          <a:ext cx="0" cy="0"/>
+          <a:chOff x="0" y="0"/>
+          <a:chExt cx="0" cy="0"/>
+        </a:xfrm>
+      </p:grpSpPr>
+      <p:sp>
+        <p:nvSpPr>
+          <p:cNvPr id="2" name="Title 1">
+            <a:extLst>
+              <a:ext uri="{FF2B5EF4-FFF2-40B4-BE49-F238E27FC236}">
+                <a16:creationId xmlns:a16="http://schemas.microsoft.com/office/drawing/2014/main" id="{38642DE1-DE3C-416D-841E-F806EFB6D7B0}"/>
+              </a:ext>
+            </a:extLst>
+          </p:cNvPr>
+          <p:cNvSpPr>
+            <a:spLocks noGrp="1"/>
+          </p:cNvSpPr>
+          <p:nvPr>
+            <p:ph type="title"/>
+          </p:nvPr>
+        </p:nvSpPr>
+        <p:spPr/>
+        <p:txBody>
+          <a:bodyPr/>
+          <a:lstStyle/>
+          <a:p>
+            <a:r>
+              <a:rPr lang="en-US" dirty="0"/>
+              <a:t>Non FTP Aware Firewall</a:t>
+            </a:r>
+          </a:p>
+        </p:txBody>
+      </p:sp>
+      <p:pic>
+        <p:nvPicPr>
+          <p:cNvPr id="5" name="Picture 4">
+            <a:extLst>
+              <a:ext uri="{FF2B5EF4-FFF2-40B4-BE49-F238E27FC236}">
+                <a16:creationId xmlns:a16="http://schemas.microsoft.com/office/drawing/2014/main" id="{641E86A7-19E6-479A-8C32-A5371BAB87EA}"/>
+              </a:ext>
+            </a:extLst>
+          </p:cNvPr>
+          <p:cNvPicPr>
+            <a:picLocks noChangeAspect="1"/>
+          </p:cNvPicPr>
+          <p:nvPr/>
+        </p:nvPicPr>
+        <p:blipFill>
+          <a:blip r:embed="rId2">
+            <a:extLst>
+              <a:ext uri="{837473B0-CC2E-450A-ABE3-18F120FF3D39}">
+                <a1611:picAttrSrcUrl xmlns:a1611="http://schemas.microsoft.com/office/drawing/2016/11/main" r:id="rId3"/>
+              </a:ext>
+            </a:extLst>
+          </a:blip>
+          <a:stretch>
+            <a:fillRect/>
+          </a:stretch>
+        </p:blipFill>
+        <p:spPr>
+          <a:xfrm>
+            <a:off x="4942593" y="3346385"/>
+            <a:ext cx="2217311" cy="1771015"/>
+          </a:xfrm>
+          <a:prstGeom prst="rect">
+            <a:avLst/>
+          </a:prstGeom>
+        </p:spPr>
+      </p:pic>
+      <p:sp>
+        <p:nvSpPr>
+          <p:cNvPr id="6" name="TextBox 5">
+            <a:extLst>
+              <a:ext uri="{FF2B5EF4-FFF2-40B4-BE49-F238E27FC236}">
+                <a16:creationId xmlns:a16="http://schemas.microsoft.com/office/drawing/2014/main" id="{06118CCC-322E-4B6D-803E-442FEB5BA682}"/>
+              </a:ext>
+            </a:extLst>
+          </p:cNvPr>
+          <p:cNvSpPr txBox="1"/>
+          <p:nvPr/>
+        </p:nvSpPr>
+        <p:spPr>
+          <a:xfrm>
+            <a:off x="4942593" y="5287825"/>
+            <a:ext cx="2217311" cy="369332"/>
+          </a:xfrm>
+          <a:prstGeom prst="rect">
+            <a:avLst/>
+          </a:prstGeom>
+          <a:noFill/>
+        </p:spPr>
+        <p:txBody>
+          <a:bodyPr wrap="square" rtlCol="0">
+            <a:spAutoFit/>
+          </a:bodyPr>
+          <a:lstStyle/>
+          <a:p>
+            <a:r>
+              <a:rPr lang="en-US" sz="900">
+                <a:hlinkClick r:id="rId3" tooltip="http://vishal--mishra.blogspot.com/2012/12/ufw-uncomplicated-firewall.html"/>
+              </a:rPr>
+              <a:t>This Photo</a:t>
+            </a:r>
+            <a:r>
+              <a:rPr lang="en-US" sz="900"/>
+              <a:t> by Unknown Author is licensed under </a:t>
+            </a:r>
+            <a:r>
+              <a:rPr lang="en-US" sz="900">
+                <a:hlinkClick r:id="rId4" tooltip="https://creativecommons.org/licenses/by-sa/3.0/"/>
+              </a:rPr>
+              <a:t>CC BY-SA</a:t>
+            </a:r>
+            <a:endParaRPr lang="en-US" sz="900"/>
+          </a:p>
+        </p:txBody>
+      </p:sp>
+      <p:pic>
+        <p:nvPicPr>
+          <p:cNvPr id="8" name="Picture 7">
+            <a:extLst>
+              <a:ext uri="{FF2B5EF4-FFF2-40B4-BE49-F238E27FC236}">
+                <a16:creationId xmlns:a16="http://schemas.microsoft.com/office/drawing/2014/main" id="{9FD16698-EE8C-43CF-89FB-954EB87F9870}"/>
+              </a:ext>
+            </a:extLst>
+          </p:cNvPr>
+          <p:cNvPicPr>
+            <a:picLocks noChangeAspect="1"/>
+          </p:cNvPicPr>
+          <p:nvPr/>
+        </p:nvPicPr>
+        <p:blipFill>
+          <a:blip r:embed="rId5">
+            <a:extLst>
+              <a:ext uri="{837473B0-CC2E-450A-ABE3-18F120FF3D39}">
+                <a1611:picAttrSrcUrl xmlns:a1611="http://schemas.microsoft.com/office/drawing/2016/11/main" r:id="rId6"/>
+              </a:ext>
+            </a:extLst>
+          </a:blip>
+          <a:stretch>
+            <a:fillRect/>
+          </a:stretch>
+        </p:blipFill>
+        <p:spPr>
+          <a:xfrm>
+            <a:off x="10221555" y="3497090"/>
+            <a:ext cx="1209156" cy="1620310"/>
+          </a:xfrm>
+          <a:prstGeom prst="rect">
+            <a:avLst/>
+          </a:prstGeom>
+        </p:spPr>
+      </p:pic>
+      <p:pic>
+        <p:nvPicPr>
+          <p:cNvPr id="10" name="Picture 9">
+            <a:extLst>
+              <a:ext uri="{FF2B5EF4-FFF2-40B4-BE49-F238E27FC236}">
+                <a16:creationId xmlns:a16="http://schemas.microsoft.com/office/drawing/2014/main" id="{88380F2C-2378-4A28-B6D8-243C0DDB9159}"/>
+              </a:ext>
+            </a:extLst>
+          </p:cNvPr>
+          <p:cNvPicPr>
+            <a:picLocks noChangeAspect="1"/>
+          </p:cNvPicPr>
+          <p:nvPr/>
+        </p:nvPicPr>
+        <p:blipFill>
+          <a:blip r:embed="rId7">
+            <a:extLst>
+              <a:ext uri="{837473B0-CC2E-450A-ABE3-18F120FF3D39}">
+                <a1611:picAttrSrcUrl xmlns:a1611="http://schemas.microsoft.com/office/drawing/2016/11/main" r:id="rId8"/>
+              </a:ext>
+            </a:extLst>
+          </a:blip>
+          <a:stretch>
+            <a:fillRect/>
+          </a:stretch>
+        </p:blipFill>
+        <p:spPr>
+          <a:xfrm>
+            <a:off x="517261" y="3346385"/>
+            <a:ext cx="2168180" cy="1983885"/>
+          </a:xfrm>
+          <a:prstGeom prst="rect">
+            <a:avLst/>
+          </a:prstGeom>
+        </p:spPr>
+      </p:pic>
+      <p:sp>
+        <p:nvSpPr>
+          <p:cNvPr id="11" name="TextBox 10">
+            <a:extLst>
+              <a:ext uri="{FF2B5EF4-FFF2-40B4-BE49-F238E27FC236}">
+                <a16:creationId xmlns:a16="http://schemas.microsoft.com/office/drawing/2014/main" id="{F348C94A-1AFF-44C0-A351-44162DA5203B}"/>
+              </a:ext>
+            </a:extLst>
+          </p:cNvPr>
+          <p:cNvSpPr txBox="1"/>
+          <p:nvPr/>
+        </p:nvSpPr>
+        <p:spPr>
+          <a:xfrm>
+            <a:off x="1224571" y="5494327"/>
+            <a:ext cx="1460870" cy="507831"/>
+          </a:xfrm>
+          <a:prstGeom prst="rect">
+            <a:avLst/>
+          </a:prstGeom>
+          <a:noFill/>
+        </p:spPr>
+        <p:txBody>
+          <a:bodyPr wrap="square" rtlCol="0">
+            <a:spAutoFit/>
+          </a:bodyPr>
+          <a:lstStyle/>
+          <a:p>
+            <a:r>
+              <a:rPr lang="en-US" sz="900">
+                <a:hlinkClick r:id="rId8" tooltip="https://lengualia.wordpress.com/tag/ortografia/"/>
+              </a:rPr>
+              <a:t>This Photo</a:t>
+            </a:r>
+            <a:r>
+              <a:rPr lang="en-US" sz="900"/>
+              <a:t> by Unknown Author is licensed under </a:t>
+            </a:r>
+            <a:r>
+              <a:rPr lang="en-US" sz="900">
+                <a:hlinkClick r:id="rId9" tooltip="https://creativecommons.org/licenses/by-nc/3.0/"/>
+              </a:rPr>
+              <a:t>CC BY-NC</a:t>
+            </a:r>
+            <a:endParaRPr lang="en-US" sz="900"/>
+          </a:p>
+        </p:txBody>
+      </p:sp>
+      <p:sp>
+        <p:nvSpPr>
+          <p:cNvPr id="12" name="Arrow: Right 11">
+            <a:extLst>
+              <a:ext uri="{FF2B5EF4-FFF2-40B4-BE49-F238E27FC236}">
+                <a16:creationId xmlns:a16="http://schemas.microsoft.com/office/drawing/2014/main" id="{5BCBF25C-3F55-4572-BB84-32F241D4EA41}"/>
+              </a:ext>
+            </a:extLst>
+          </p:cNvPr>
+          <p:cNvSpPr/>
+          <p:nvPr/>
+        </p:nvSpPr>
+        <p:spPr>
+          <a:xfrm>
+            <a:off x="3166160" y="2727087"/>
+            <a:ext cx="6553872" cy="484632"/>
+          </a:xfrm>
+          <a:prstGeom prst="rightArrow">
+            <a:avLst/>
+          </a:prstGeom>
+        </p:spPr>
+        <p:style>
+          <a:lnRef idx="2">
+            <a:schemeClr val="accent1">
+              <a:shade val="50000"/>
+            </a:schemeClr>
+          </a:lnRef>
+          <a:fillRef idx="1">
+            <a:schemeClr val="accent1"/>
+          </a:fillRef>
+          <a:effectRef idx="0">
+            <a:schemeClr val="accent1"/>
+          </a:effectRef>
+          <a:fontRef idx="minor">
+            <a:schemeClr val="lt1"/>
+          </a:fontRef>
+        </p:style>
+        <p:txBody>
+          <a:bodyPr rtlCol="0" anchor="ctr"/>
+          <a:lstStyle/>
+          <a:p>
+            <a:pPr algn="ctr"/>
+            <a:r>
+              <a:rPr lang="en-US" dirty="0"/>
+              <a:t>Connect to FTP Server on port 21</a:t>
+            </a:r>
+          </a:p>
+        </p:txBody>
+      </p:sp>
+      <p:sp>
+        <p:nvSpPr>
+          <p:cNvPr id="13" name="Arrow: Right 12">
+            <a:extLst>
+              <a:ext uri="{FF2B5EF4-FFF2-40B4-BE49-F238E27FC236}">
+                <a16:creationId xmlns:a16="http://schemas.microsoft.com/office/drawing/2014/main" id="{FBABF107-71AC-4404-B809-14D653C8E688}"/>
+              </a:ext>
+            </a:extLst>
+          </p:cNvPr>
+          <p:cNvSpPr/>
+          <p:nvPr/>
+        </p:nvSpPr>
+        <p:spPr>
+          <a:xfrm>
+            <a:off x="3176562" y="3382144"/>
+            <a:ext cx="6553872" cy="484632"/>
+          </a:xfrm>
+          <a:prstGeom prst="rightArrow">
+            <a:avLst/>
+          </a:prstGeom>
+        </p:spPr>
+        <p:style>
+          <a:lnRef idx="2">
+            <a:schemeClr val="accent1">
+              <a:shade val="50000"/>
+            </a:schemeClr>
+          </a:lnRef>
+          <a:fillRef idx="1">
+            <a:schemeClr val="accent1"/>
+          </a:fillRef>
+          <a:effectRef idx="0">
+            <a:schemeClr val="accent1"/>
+          </a:effectRef>
+          <a:fontRef idx="minor">
+            <a:schemeClr val="lt1"/>
+          </a:fontRef>
+        </p:style>
+        <p:txBody>
+          <a:bodyPr rtlCol="0" anchor="ctr"/>
+          <a:lstStyle/>
+          <a:p>
+            <a:pPr algn="ctr"/>
+            <a:r>
+              <a:rPr lang="en-US" dirty="0"/>
+              <a:t>Announce FTP client is listening on port 9210</a:t>
+            </a:r>
+          </a:p>
+        </p:txBody>
+      </p:sp>
+      <p:sp>
+        <p:nvSpPr>
+          <p:cNvPr id="14" name="Arrow: Left 13">
+            <a:extLst>
+              <a:ext uri="{FF2B5EF4-FFF2-40B4-BE49-F238E27FC236}">
+                <a16:creationId xmlns:a16="http://schemas.microsoft.com/office/drawing/2014/main" id="{022C637C-3663-4F2D-B62C-3BF2782262B3}"/>
+              </a:ext>
+            </a:extLst>
+          </p:cNvPr>
+          <p:cNvSpPr/>
+          <p:nvPr/>
+        </p:nvSpPr>
+        <p:spPr>
+          <a:xfrm>
+            <a:off x="7209228" y="4064929"/>
+            <a:ext cx="2521206" cy="484632"/>
+          </a:xfrm>
+          <a:prstGeom prst="leftArrow">
+            <a:avLst/>
+          </a:prstGeom>
+        </p:spPr>
+        <p:style>
+          <a:lnRef idx="2">
+            <a:schemeClr val="accent3">
+              <a:shade val="50000"/>
+            </a:schemeClr>
+          </a:lnRef>
+          <a:fillRef idx="1">
+            <a:schemeClr val="accent3"/>
+          </a:fillRef>
+          <a:effectRef idx="0">
+            <a:schemeClr val="accent3"/>
+          </a:effectRef>
+          <a:fontRef idx="minor">
+            <a:schemeClr val="lt1"/>
+          </a:fontRef>
+        </p:style>
+        <p:txBody>
+          <a:bodyPr rtlCol="0" anchor="ctr"/>
+          <a:lstStyle/>
+          <a:p>
+            <a:pPr algn="ctr"/>
+            <a:r>
+              <a:rPr lang="en-US" dirty="0"/>
+              <a:t>Connect to 9210</a:t>
+            </a:r>
+          </a:p>
+        </p:txBody>
+      </p:sp>
+      <p:sp>
+        <p:nvSpPr>
+          <p:cNvPr id="15" name="Multiplication Sign 14">
+            <a:extLst>
+              <a:ext uri="{FF2B5EF4-FFF2-40B4-BE49-F238E27FC236}">
+                <a16:creationId xmlns:a16="http://schemas.microsoft.com/office/drawing/2014/main" id="{20EEBBB8-35E5-4412-9CCF-01823966EAFB}"/>
+              </a:ext>
+            </a:extLst>
+          </p:cNvPr>
+          <p:cNvSpPr/>
+          <p:nvPr/>
+        </p:nvSpPr>
+        <p:spPr>
+          <a:xfrm>
+            <a:off x="6443096" y="3844877"/>
+            <a:ext cx="914400" cy="914400"/>
+          </a:xfrm>
+          <a:prstGeom prst="mathMultiply">
+            <a:avLst/>
+          </a:prstGeom>
+        </p:spPr>
+        <p:style>
+          <a:lnRef idx="2">
+            <a:schemeClr val="dk1">
+              <a:shade val="50000"/>
+            </a:schemeClr>
+          </a:lnRef>
+          <a:fillRef idx="1">
+            <a:schemeClr val="dk1"/>
+          </a:fillRef>
+          <a:effectRef idx="0">
+            <a:schemeClr val="dk1"/>
+          </a:effectRef>
+          <a:fontRef idx="minor">
+            <a:schemeClr val="lt1"/>
+          </a:fontRef>
+        </p:style>
+        <p:txBody>
+          <a:bodyPr rtlCol="0" anchor="ctr"/>
+          <a:lstStyle/>
+          <a:p>
+            <a:pPr algn="ctr"/>
+            <a:endParaRPr lang="en-US"/>
+          </a:p>
+        </p:txBody>
+      </p:sp>
+    </p:spTree>
+    <p:extLst>
+      <p:ext uri="{BB962C8B-B14F-4D97-AF65-F5344CB8AC3E}">
+        <p14:creationId xmlns:p14="http://schemas.microsoft.com/office/powerpoint/2010/main" val="2833010199"/>
+      </p:ext>
+    </p:extLst>
+  </p:cSld>
+  <p:clrMapOvr>
+    <a:masterClrMapping/>
+  </p:clrMapOvr>
+</p:sld>
+</file>
+
+<file path=ppt/slides/slide33.xml><?xml version="1.0" encoding="utf-8"?>
+<p:sld xmlns:a="http://schemas.openxmlformats.org/drawingml/2006/main" xmlns:r="http://schemas.openxmlformats.org/officeDocument/2006/relationships" xmlns:p="http://schemas.openxmlformats.org/presentationml/2006/main">
+  <p:cSld>
+    <p:spTree>
+      <p:nvGrpSpPr>
+        <p:cNvPr id="1" name=""/>
+        <p:cNvGrpSpPr/>
+        <p:nvPr/>
+      </p:nvGrpSpPr>
+      <p:grpSpPr>
+        <a:xfrm>
+          <a:off x="0" y="0"/>
+          <a:ext cx="0" cy="0"/>
+          <a:chOff x="0" y="0"/>
+          <a:chExt cx="0" cy="0"/>
+        </a:xfrm>
+      </p:grpSpPr>
+      <p:pic>
+        <p:nvPicPr>
+          <p:cNvPr id="5" name="Picture 4">
+            <a:extLst>
+              <a:ext uri="{FF2B5EF4-FFF2-40B4-BE49-F238E27FC236}">
+                <a16:creationId xmlns:a16="http://schemas.microsoft.com/office/drawing/2014/main" id="{641E86A7-19E6-479A-8C32-A5371BAB87EA}"/>
+              </a:ext>
+            </a:extLst>
+          </p:cNvPr>
+          <p:cNvPicPr>
+            <a:picLocks noChangeAspect="1"/>
+          </p:cNvPicPr>
+          <p:nvPr/>
+        </p:nvPicPr>
+        <p:blipFill>
+          <a:blip r:embed="rId2">
+            <a:extLst>
+              <a:ext uri="{837473B0-CC2E-450A-ABE3-18F120FF3D39}">
+                <a1611:picAttrSrcUrl xmlns:a1611="http://schemas.microsoft.com/office/drawing/2016/11/main" r:id="rId3"/>
+              </a:ext>
+            </a:extLst>
+          </a:blip>
+          <a:stretch>
+            <a:fillRect/>
+          </a:stretch>
+        </p:blipFill>
+        <p:spPr>
+          <a:xfrm>
+            <a:off x="4942593" y="3346385"/>
+            <a:ext cx="2217311" cy="1771015"/>
+          </a:xfrm>
+          <a:prstGeom prst="rect">
+            <a:avLst/>
+          </a:prstGeom>
+        </p:spPr>
+      </p:pic>
+      <p:sp>
+        <p:nvSpPr>
+          <p:cNvPr id="9" name="Flowchart: Sequential Access Storage 8">
+            <a:extLst>
+              <a:ext uri="{FF2B5EF4-FFF2-40B4-BE49-F238E27FC236}">
+                <a16:creationId xmlns:a16="http://schemas.microsoft.com/office/drawing/2014/main" id="{D5CFD16C-364C-44D3-8FC4-2BAECD54A31D}"/>
+              </a:ext>
+            </a:extLst>
+          </p:cNvPr>
+          <p:cNvSpPr/>
+          <p:nvPr/>
+        </p:nvSpPr>
+        <p:spPr>
+          <a:xfrm flipH="1">
+            <a:off x="6884546" y="3949461"/>
+            <a:ext cx="2134580" cy="612648"/>
+          </a:xfrm>
+          <a:prstGeom prst="flowChartMagneticTape">
+            <a:avLst/>
+          </a:prstGeom>
+        </p:spPr>
+        <p:style>
+          <a:lnRef idx="2">
+            <a:schemeClr val="accent6"/>
+          </a:lnRef>
+          <a:fillRef idx="1">
+            <a:schemeClr val="lt1"/>
+          </a:fillRef>
+          <a:effectRef idx="0">
+            <a:schemeClr val="accent6"/>
+          </a:effectRef>
+          <a:fontRef idx="minor">
+            <a:schemeClr val="dk1"/>
+          </a:fontRef>
+        </p:style>
+        <p:txBody>
+          <a:bodyPr rtlCol="0" anchor="ctr"/>
+          <a:lstStyle/>
+          <a:p>
+            <a:pPr algn="ctr"/>
+            <a:endParaRPr lang="en-US"/>
+          </a:p>
+        </p:txBody>
+      </p:sp>
+      <p:sp>
+        <p:nvSpPr>
+          <p:cNvPr id="2" name="Title 1">
+            <a:extLst>
+              <a:ext uri="{FF2B5EF4-FFF2-40B4-BE49-F238E27FC236}">
+                <a16:creationId xmlns:a16="http://schemas.microsoft.com/office/drawing/2014/main" id="{38642DE1-DE3C-416D-841E-F806EFB6D7B0}"/>
+              </a:ext>
+            </a:extLst>
+          </p:cNvPr>
+          <p:cNvSpPr>
+            <a:spLocks noGrp="1"/>
+          </p:cNvSpPr>
+          <p:nvPr>
+            <p:ph type="title"/>
+          </p:nvPr>
+        </p:nvSpPr>
+        <p:spPr/>
+        <p:txBody>
+          <a:bodyPr/>
+          <a:lstStyle/>
+          <a:p>
+            <a:r>
+              <a:rPr lang="en-US" dirty="0"/>
+              <a:t>FTP Aware Firewall</a:t>
+            </a:r>
+          </a:p>
+        </p:txBody>
+      </p:sp>
+      <p:sp>
+        <p:nvSpPr>
+          <p:cNvPr id="6" name="TextBox 5">
+            <a:extLst>
+              <a:ext uri="{FF2B5EF4-FFF2-40B4-BE49-F238E27FC236}">
+                <a16:creationId xmlns:a16="http://schemas.microsoft.com/office/drawing/2014/main" id="{06118CCC-322E-4B6D-803E-442FEB5BA682}"/>
+              </a:ext>
+            </a:extLst>
+          </p:cNvPr>
+          <p:cNvSpPr txBox="1"/>
+          <p:nvPr/>
+        </p:nvSpPr>
+        <p:spPr>
+          <a:xfrm>
+            <a:off x="4942593" y="5287825"/>
+            <a:ext cx="2217311" cy="369332"/>
+          </a:xfrm>
+          <a:prstGeom prst="rect">
+            <a:avLst/>
+          </a:prstGeom>
+          <a:noFill/>
+        </p:spPr>
+        <p:txBody>
+          <a:bodyPr wrap="square" rtlCol="0">
+            <a:spAutoFit/>
+          </a:bodyPr>
+          <a:lstStyle/>
+          <a:p>
+            <a:r>
+              <a:rPr lang="en-US" sz="900">
+                <a:hlinkClick r:id="rId3" tooltip="http://vishal--mishra.blogspot.com/2012/12/ufw-uncomplicated-firewall.html"/>
+              </a:rPr>
+              <a:t>This Photo</a:t>
+            </a:r>
+            <a:r>
+              <a:rPr lang="en-US" sz="900"/>
+              <a:t> by Unknown Author is licensed under </a:t>
+            </a:r>
+            <a:r>
+              <a:rPr lang="en-US" sz="900">
+                <a:hlinkClick r:id="rId4" tooltip="https://creativecommons.org/licenses/by-sa/3.0/"/>
+              </a:rPr>
+              <a:t>CC BY-SA</a:t>
+            </a:r>
+            <a:endParaRPr lang="en-US" sz="900"/>
+          </a:p>
+        </p:txBody>
+      </p:sp>
+      <p:pic>
+        <p:nvPicPr>
+          <p:cNvPr id="8" name="Picture 7">
+            <a:extLst>
+              <a:ext uri="{FF2B5EF4-FFF2-40B4-BE49-F238E27FC236}">
+                <a16:creationId xmlns:a16="http://schemas.microsoft.com/office/drawing/2014/main" id="{9FD16698-EE8C-43CF-89FB-954EB87F9870}"/>
+              </a:ext>
+            </a:extLst>
+          </p:cNvPr>
+          <p:cNvPicPr>
+            <a:picLocks noChangeAspect="1"/>
+          </p:cNvPicPr>
+          <p:nvPr/>
+        </p:nvPicPr>
+        <p:blipFill>
+          <a:blip r:embed="rId5">
+            <a:extLst>
+              <a:ext uri="{837473B0-CC2E-450A-ABE3-18F120FF3D39}">
+                <a1611:picAttrSrcUrl xmlns:a1611="http://schemas.microsoft.com/office/drawing/2016/11/main" r:id="rId6"/>
+              </a:ext>
+            </a:extLst>
+          </a:blip>
+          <a:stretch>
+            <a:fillRect/>
+          </a:stretch>
+        </p:blipFill>
+        <p:spPr>
+          <a:xfrm>
+            <a:off x="10221555" y="3497090"/>
+            <a:ext cx="1209156" cy="1620310"/>
+          </a:xfrm>
+          <a:prstGeom prst="rect">
+            <a:avLst/>
+          </a:prstGeom>
+        </p:spPr>
+      </p:pic>
+      <p:pic>
+        <p:nvPicPr>
+          <p:cNvPr id="10" name="Picture 9">
+            <a:extLst>
+              <a:ext uri="{FF2B5EF4-FFF2-40B4-BE49-F238E27FC236}">
+                <a16:creationId xmlns:a16="http://schemas.microsoft.com/office/drawing/2014/main" id="{88380F2C-2378-4A28-B6D8-243C0DDB9159}"/>
+              </a:ext>
+            </a:extLst>
+          </p:cNvPr>
+          <p:cNvPicPr>
+            <a:picLocks noChangeAspect="1"/>
+          </p:cNvPicPr>
+          <p:nvPr/>
+        </p:nvPicPr>
+        <p:blipFill>
+          <a:blip r:embed="rId7">
+            <a:extLst>
+              <a:ext uri="{837473B0-CC2E-450A-ABE3-18F120FF3D39}">
+                <a1611:picAttrSrcUrl xmlns:a1611="http://schemas.microsoft.com/office/drawing/2016/11/main" r:id="rId8"/>
+              </a:ext>
+            </a:extLst>
+          </a:blip>
+          <a:stretch>
+            <a:fillRect/>
+          </a:stretch>
+        </p:blipFill>
+        <p:spPr>
+          <a:xfrm>
+            <a:off x="517261" y="3346385"/>
+            <a:ext cx="2168180" cy="1983885"/>
+          </a:xfrm>
+          <a:prstGeom prst="rect">
+            <a:avLst/>
+          </a:prstGeom>
+        </p:spPr>
+      </p:pic>
+      <p:sp>
+        <p:nvSpPr>
+          <p:cNvPr id="11" name="TextBox 10">
+            <a:extLst>
+              <a:ext uri="{FF2B5EF4-FFF2-40B4-BE49-F238E27FC236}">
+                <a16:creationId xmlns:a16="http://schemas.microsoft.com/office/drawing/2014/main" id="{F348C94A-1AFF-44C0-A351-44162DA5203B}"/>
+              </a:ext>
+            </a:extLst>
+          </p:cNvPr>
+          <p:cNvSpPr txBox="1"/>
+          <p:nvPr/>
+        </p:nvSpPr>
+        <p:spPr>
+          <a:xfrm>
+            <a:off x="1224571" y="5494327"/>
+            <a:ext cx="1460870" cy="507831"/>
+          </a:xfrm>
+          <a:prstGeom prst="rect">
+            <a:avLst/>
+          </a:prstGeom>
+          <a:noFill/>
+        </p:spPr>
+        <p:txBody>
+          <a:bodyPr wrap="square" rtlCol="0">
+            <a:spAutoFit/>
+          </a:bodyPr>
+          <a:lstStyle/>
+          <a:p>
+            <a:r>
+              <a:rPr lang="en-US" sz="900">
+                <a:hlinkClick r:id="rId8" tooltip="https://lengualia.wordpress.com/tag/ortografia/"/>
+              </a:rPr>
+              <a:t>This Photo</a:t>
+            </a:r>
+            <a:r>
+              <a:rPr lang="en-US" sz="900"/>
+              <a:t> by Unknown Author is licensed under </a:t>
+            </a:r>
+            <a:r>
+              <a:rPr lang="en-US" sz="900">
+                <a:hlinkClick r:id="rId9" tooltip="https://creativecommons.org/licenses/by-nc/3.0/"/>
+              </a:rPr>
+              <a:t>CC BY-NC</a:t>
+            </a:r>
+            <a:endParaRPr lang="en-US" sz="900"/>
+          </a:p>
+        </p:txBody>
+      </p:sp>
+      <p:sp>
+        <p:nvSpPr>
+          <p:cNvPr id="12" name="Arrow: Right 11">
+            <a:extLst>
+              <a:ext uri="{FF2B5EF4-FFF2-40B4-BE49-F238E27FC236}">
+                <a16:creationId xmlns:a16="http://schemas.microsoft.com/office/drawing/2014/main" id="{5BCBF25C-3F55-4572-BB84-32F241D4EA41}"/>
+              </a:ext>
+            </a:extLst>
+          </p:cNvPr>
+          <p:cNvSpPr/>
+          <p:nvPr/>
+        </p:nvSpPr>
+        <p:spPr>
+          <a:xfrm>
+            <a:off x="3166160" y="2727087"/>
+            <a:ext cx="6553872" cy="484632"/>
+          </a:xfrm>
+          <a:prstGeom prst="rightArrow">
+            <a:avLst/>
+          </a:prstGeom>
+        </p:spPr>
+        <p:style>
+          <a:lnRef idx="2">
+            <a:schemeClr val="accent1">
+              <a:shade val="50000"/>
+            </a:schemeClr>
+          </a:lnRef>
+          <a:fillRef idx="1">
+            <a:schemeClr val="accent1"/>
+          </a:fillRef>
+          <a:effectRef idx="0">
+            <a:schemeClr val="accent1"/>
+          </a:effectRef>
+          <a:fontRef idx="minor">
+            <a:schemeClr val="lt1"/>
+          </a:fontRef>
+        </p:style>
+        <p:txBody>
+          <a:bodyPr rtlCol="0" anchor="ctr"/>
+          <a:lstStyle/>
+          <a:p>
+            <a:pPr algn="ctr"/>
+            <a:r>
+              <a:rPr lang="en-US" dirty="0"/>
+              <a:t>Connect to FTP Server on port 21</a:t>
+            </a:r>
+          </a:p>
+        </p:txBody>
+      </p:sp>
+      <p:sp>
+        <p:nvSpPr>
+          <p:cNvPr id="13" name="Arrow: Right 12">
+            <a:extLst>
+              <a:ext uri="{FF2B5EF4-FFF2-40B4-BE49-F238E27FC236}">
+                <a16:creationId xmlns:a16="http://schemas.microsoft.com/office/drawing/2014/main" id="{FBABF107-71AC-4404-B809-14D653C8E688}"/>
+              </a:ext>
+            </a:extLst>
+          </p:cNvPr>
+          <p:cNvSpPr/>
+          <p:nvPr/>
+        </p:nvSpPr>
+        <p:spPr>
+          <a:xfrm>
+            <a:off x="3176562" y="3382144"/>
+            <a:ext cx="6553872" cy="484632"/>
+          </a:xfrm>
+          <a:prstGeom prst="rightArrow">
+            <a:avLst/>
+          </a:prstGeom>
+        </p:spPr>
+        <p:style>
+          <a:lnRef idx="2">
+            <a:schemeClr val="accent1">
+              <a:shade val="50000"/>
+            </a:schemeClr>
+          </a:lnRef>
+          <a:fillRef idx="1">
+            <a:schemeClr val="accent1"/>
+          </a:fillRef>
+          <a:effectRef idx="0">
+            <a:schemeClr val="accent1"/>
+          </a:effectRef>
+          <a:fontRef idx="minor">
+            <a:schemeClr val="lt1"/>
+          </a:fontRef>
+        </p:style>
+        <p:txBody>
+          <a:bodyPr rtlCol="0" anchor="ctr"/>
+          <a:lstStyle/>
+          <a:p>
+            <a:pPr algn="ctr"/>
+            <a:r>
+              <a:rPr lang="en-US" dirty="0"/>
+              <a:t>Announce FTP client is listening on port 9210</a:t>
+            </a:r>
+          </a:p>
+        </p:txBody>
+      </p:sp>
+      <p:sp>
+        <p:nvSpPr>
+          <p:cNvPr id="14" name="Arrow: Left 13">
+            <a:extLst>
+              <a:ext uri="{FF2B5EF4-FFF2-40B4-BE49-F238E27FC236}">
+                <a16:creationId xmlns:a16="http://schemas.microsoft.com/office/drawing/2014/main" id="{022C637C-3663-4F2D-B62C-3BF2782262B3}"/>
+              </a:ext>
+            </a:extLst>
+          </p:cNvPr>
+          <p:cNvSpPr/>
+          <p:nvPr/>
+        </p:nvSpPr>
+        <p:spPr>
+          <a:xfrm>
+            <a:off x="3222555" y="4875084"/>
+            <a:ext cx="6507879" cy="484632"/>
+          </a:xfrm>
+          <a:prstGeom prst="leftArrow">
+            <a:avLst/>
+          </a:prstGeom>
+        </p:spPr>
+        <p:style>
+          <a:lnRef idx="2">
+            <a:schemeClr val="accent3">
+              <a:shade val="50000"/>
+            </a:schemeClr>
+          </a:lnRef>
+          <a:fillRef idx="1">
+            <a:schemeClr val="accent3"/>
+          </a:fillRef>
+          <a:effectRef idx="0">
+            <a:schemeClr val="accent3"/>
+          </a:effectRef>
+          <a:fontRef idx="minor">
+            <a:schemeClr val="lt1"/>
+          </a:fontRef>
+        </p:style>
+        <p:txBody>
+          <a:bodyPr rtlCol="0" anchor="ctr"/>
+          <a:lstStyle/>
+          <a:p>
+            <a:pPr algn="ctr"/>
+            <a:r>
+              <a:rPr lang="en-US" dirty="0"/>
+              <a:t>Connect to 9210</a:t>
+            </a:r>
+          </a:p>
+        </p:txBody>
+      </p:sp>
+      <p:pic>
+        <p:nvPicPr>
+          <p:cNvPr id="4" name="Picture 3">
+            <a:extLst>
+              <a:ext uri="{FF2B5EF4-FFF2-40B4-BE49-F238E27FC236}">
+                <a16:creationId xmlns:a16="http://schemas.microsoft.com/office/drawing/2014/main" id="{BFE86CBF-9C67-4D9E-974A-5C325CA27DC2}"/>
+              </a:ext>
+            </a:extLst>
+          </p:cNvPr>
+          <p:cNvPicPr>
+            <a:picLocks noChangeAspect="1"/>
+          </p:cNvPicPr>
+          <p:nvPr/>
+        </p:nvPicPr>
+        <p:blipFill>
+          <a:blip r:embed="rId10">
+            <a:extLst>
+              <a:ext uri="{837473B0-CC2E-450A-ABE3-18F120FF3D39}">
+                <a1611:picAttrSrcUrl xmlns:a1611="http://schemas.microsoft.com/office/drawing/2016/11/main" r:id="rId11"/>
+              </a:ext>
+            </a:extLst>
+          </a:blip>
+          <a:stretch>
+            <a:fillRect/>
+          </a:stretch>
+        </p:blipFill>
+        <p:spPr>
+          <a:xfrm>
+            <a:off x="7697018" y="2969403"/>
+            <a:ext cx="1656828" cy="2215258"/>
+          </a:xfrm>
+          <a:prstGeom prst="rect">
+            <a:avLst/>
+          </a:prstGeom>
+        </p:spPr>
+      </p:pic>
+      <p:sp>
+        <p:nvSpPr>
+          <p:cNvPr id="7" name="TextBox 6">
+            <a:extLst>
+              <a:ext uri="{FF2B5EF4-FFF2-40B4-BE49-F238E27FC236}">
+                <a16:creationId xmlns:a16="http://schemas.microsoft.com/office/drawing/2014/main" id="{130D9B4B-45F7-49A6-A5A3-26456D5C9730}"/>
+              </a:ext>
+            </a:extLst>
+          </p:cNvPr>
+          <p:cNvSpPr txBox="1"/>
+          <p:nvPr/>
+        </p:nvSpPr>
+        <p:spPr>
+          <a:xfrm>
+            <a:off x="7077537" y="4071119"/>
+            <a:ext cx="1511952" cy="369332"/>
+          </a:xfrm>
+          <a:prstGeom prst="rect">
+            <a:avLst/>
+          </a:prstGeom>
+          <a:noFill/>
+        </p:spPr>
+        <p:txBody>
+          <a:bodyPr wrap="none" rtlCol="0">
+            <a:spAutoFit/>
+          </a:bodyPr>
+          <a:lstStyle/>
+          <a:p>
+            <a:r>
+              <a:rPr lang="en-US" b="1" dirty="0"/>
+              <a:t>OPEN 9210!</a:t>
+            </a:r>
+          </a:p>
+        </p:txBody>
+      </p:sp>
+    </p:spTree>
+    <p:extLst>
+      <p:ext uri="{BB962C8B-B14F-4D97-AF65-F5344CB8AC3E}">
+        <p14:creationId xmlns:p14="http://schemas.microsoft.com/office/powerpoint/2010/main" val="3049974012"/>
+      </p:ext>
+    </p:extLst>
+  </p:cSld>
+  <p:clrMapOvr>
+    <a:masterClrMapping/>
+  </p:clrMapOvr>
+</p:sld>
+</file>
+
+<file path=ppt/slides/slide34.xml><?xml version="1.0" encoding="utf-8"?>
+<p:sld xmlns:a="http://schemas.openxmlformats.org/drawingml/2006/main" xmlns:r="http://schemas.openxmlformats.org/officeDocument/2006/relationships" xmlns:p="http://schemas.openxmlformats.org/presentationml/2006/main">
+  <p:cSld>
+    <p:spTree>
+      <p:nvGrpSpPr>
+        <p:cNvPr id="1" name=""/>
+        <p:cNvGrpSpPr/>
+        <p:nvPr/>
+      </p:nvGrpSpPr>
+      <p:grpSpPr>
+        <a:xfrm>
+          <a:off x="0" y="0"/>
+          <a:ext cx="0" cy="0"/>
+          <a:chOff x="0" y="0"/>
+          <a:chExt cx="0" cy="0"/>
+        </a:xfrm>
+      </p:grpSpPr>
+      <p:sp>
+        <p:nvSpPr>
+          <p:cNvPr id="2" name="Title 1">
+            <a:extLst>
+              <a:ext uri="{FF2B5EF4-FFF2-40B4-BE49-F238E27FC236}">
+                <a16:creationId xmlns:a16="http://schemas.microsoft.com/office/drawing/2014/main" id="{98145655-1F9C-4F5E-B97D-043BB4E10BDE}"/>
+              </a:ext>
+            </a:extLst>
+          </p:cNvPr>
+          <p:cNvSpPr>
+            <a:spLocks noGrp="1"/>
+          </p:cNvSpPr>
+          <p:nvPr>
+            <p:ph type="title"/>
+          </p:nvPr>
+        </p:nvSpPr>
+        <p:spPr/>
+        <p:txBody>
+          <a:bodyPr/>
+          <a:lstStyle/>
+          <a:p>
+            <a:r>
+              <a:rPr lang="en-US" dirty="0"/>
+              <a:t>Tracking Users</a:t>
+            </a:r>
+          </a:p>
+        </p:txBody>
+      </p:sp>
+      <p:sp>
+        <p:nvSpPr>
+          <p:cNvPr id="3" name="Content Placeholder 2">
+            <a:extLst>
+              <a:ext uri="{FF2B5EF4-FFF2-40B4-BE49-F238E27FC236}">
+                <a16:creationId xmlns:a16="http://schemas.microsoft.com/office/drawing/2014/main" id="{61C4507B-A784-43F3-BA3B-F6D97358E516}"/>
+              </a:ext>
+            </a:extLst>
+          </p:cNvPr>
+          <p:cNvSpPr>
+            <a:spLocks noGrp="1"/>
+          </p:cNvSpPr>
+          <p:nvPr>
+            <p:ph idx="1"/>
+          </p:nvPr>
+        </p:nvSpPr>
+        <p:spPr/>
+        <p:txBody>
+          <a:bodyPr/>
+          <a:lstStyle/>
+          <a:p>
+            <a:r>
+              <a:rPr lang="en-US" dirty="0"/>
+              <a:t>Since the early 90’s, many firewalls also supported their own services</a:t>
+            </a:r>
+          </a:p>
+          <a:p>
+            <a:r>
+              <a:rPr lang="en-US" dirty="0"/>
+              <a:t>Users could connect to the firewall </a:t>
+            </a:r>
+            <a:r>
+              <a:rPr lang="en-US" i="1" dirty="0"/>
+              <a:t>as a server</a:t>
+            </a:r>
+            <a:r>
+              <a:rPr lang="en-US" dirty="0"/>
+              <a:t> and, for example, log-in</a:t>
+            </a:r>
+          </a:p>
+          <a:p>
+            <a:r>
+              <a:rPr lang="en-US" dirty="0"/>
+              <a:t>The logging-in process could map a </a:t>
+            </a:r>
+          </a:p>
+          <a:p>
+            <a:pPr lvl="1"/>
+            <a:r>
+              <a:rPr lang="en-US" dirty="0"/>
+              <a:t>user-name to an IP address</a:t>
+            </a:r>
+          </a:p>
+          <a:p>
+            <a:pPr lvl="1"/>
+            <a:r>
+              <a:rPr lang="en-US" dirty="0"/>
+              <a:t>Or even a point-to-point protocol with encryption (or VPN)</a:t>
+            </a:r>
+          </a:p>
+          <a:p>
+            <a:r>
+              <a:rPr lang="en-US" dirty="0"/>
+              <a:t>Combined with application scanning, far more granular policies enforced</a:t>
+            </a:r>
+          </a:p>
+        </p:txBody>
+      </p:sp>
+    </p:spTree>
+    <p:extLst>
+      <p:ext uri="{BB962C8B-B14F-4D97-AF65-F5344CB8AC3E}">
+        <p14:creationId xmlns:p14="http://schemas.microsoft.com/office/powerpoint/2010/main" val="2422921061"/>
+      </p:ext>
+    </p:extLst>
+  </p:cSld>
+  <p:clrMapOvr>
+    <a:masterClrMapping/>
+  </p:clrMapOvr>
+</p:sld>
+</file>
+
+<file path=ppt/slides/slide35.xml><?xml version="1.0" encoding="utf-8"?>
+<p:sld xmlns:a="http://schemas.openxmlformats.org/drawingml/2006/main" xmlns:r="http://schemas.openxmlformats.org/officeDocument/2006/relationships" xmlns:p="http://schemas.openxmlformats.org/presentationml/2006/main">
+  <p:cSld>
+    <p:spTree>
+      <p:nvGrpSpPr>
+        <p:cNvPr id="1" name=""/>
+        <p:cNvGrpSpPr/>
+        <p:nvPr/>
+      </p:nvGrpSpPr>
+      <p:grpSpPr>
+        <a:xfrm>
+          <a:off x="0" y="0"/>
+          <a:ext cx="0" cy="0"/>
+          <a:chOff x="0" y="0"/>
+          <a:chExt cx="0" cy="0"/>
+        </a:xfrm>
+      </p:grpSpPr>
+      <p:sp>
+        <p:nvSpPr>
+          <p:cNvPr id="2" name="Title 1">
+            <a:extLst>
+              <a:ext uri="{FF2B5EF4-FFF2-40B4-BE49-F238E27FC236}">
+                <a16:creationId xmlns:a16="http://schemas.microsoft.com/office/drawing/2014/main" id="{B1421B6A-31A6-4046-AE68-29458514B774}"/>
+              </a:ext>
+            </a:extLst>
+          </p:cNvPr>
+          <p:cNvSpPr>
+            <a:spLocks noGrp="1"/>
+          </p:cNvSpPr>
+          <p:nvPr>
+            <p:ph type="title"/>
+          </p:nvPr>
+        </p:nvSpPr>
+        <p:spPr/>
+        <p:txBody>
+          <a:bodyPr/>
+          <a:lstStyle/>
+          <a:p>
+            <a:r>
+              <a:rPr lang="en-US" dirty="0"/>
+              <a:t>L7+User Policy Enforcement</a:t>
+            </a:r>
+          </a:p>
+        </p:txBody>
+      </p:sp>
+      <p:sp>
+        <p:nvSpPr>
+          <p:cNvPr id="3" name="Content Placeholder 2">
+            <a:extLst>
+              <a:ext uri="{FF2B5EF4-FFF2-40B4-BE49-F238E27FC236}">
+                <a16:creationId xmlns:a16="http://schemas.microsoft.com/office/drawing/2014/main" id="{695AEA76-1C5E-4C79-8418-F7D7ADF6FB88}"/>
+              </a:ext>
+            </a:extLst>
+          </p:cNvPr>
+          <p:cNvSpPr>
+            <a:spLocks noGrp="1"/>
+          </p:cNvSpPr>
+          <p:nvPr>
+            <p:ph idx="1"/>
+          </p:nvPr>
+        </p:nvSpPr>
+        <p:spPr/>
+        <p:txBody>
+          <a:bodyPr/>
+          <a:lstStyle/>
+          <a:p>
+            <a:r>
+              <a:rPr lang="en-US" dirty="0"/>
+              <a:t>Policy #2: Only authorized users from outside the LAN can access LAN resources</a:t>
+            </a:r>
+          </a:p>
+          <a:p>
+            <a:r>
+              <a:rPr lang="en-US" dirty="0"/>
+              <a:t>Policy #3: Only authorized users on the LAN can access authorized services outside the LAN</a:t>
+            </a:r>
+          </a:p>
+          <a:p>
+            <a:endParaRPr lang="en-US" dirty="0"/>
+          </a:p>
+          <a:p>
+            <a:r>
+              <a:rPr lang="en-US" dirty="0"/>
+              <a:t>LAN resources can now be </a:t>
+            </a:r>
+            <a:r>
+              <a:rPr lang="en-US" i="1" dirty="0"/>
+              <a:t>application specific!</a:t>
+            </a:r>
+            <a:endParaRPr lang="en-US" dirty="0"/>
+          </a:p>
+          <a:p>
+            <a:pPr lvl="1"/>
+            <a:r>
+              <a:rPr lang="en-US" dirty="0"/>
+              <a:t>User X can only download on FTP</a:t>
+            </a:r>
+          </a:p>
+          <a:p>
+            <a:pPr lvl="1"/>
+            <a:r>
+              <a:rPr lang="en-US" dirty="0"/>
+              <a:t>User Y can upload or download on FTP</a:t>
+            </a:r>
+          </a:p>
+        </p:txBody>
+      </p:sp>
+    </p:spTree>
+    <p:extLst>
+      <p:ext uri="{BB962C8B-B14F-4D97-AF65-F5344CB8AC3E}">
+        <p14:creationId xmlns:p14="http://schemas.microsoft.com/office/powerpoint/2010/main" val="202959910"/>
+      </p:ext>
+    </p:extLst>
+  </p:cSld>
+  <p:clrMapOvr>
+    <a:masterClrMapping/>
+  </p:clrMapOvr>
+</p:sld>
+</file>
+
+<file path=ppt/slides/slide36.xml><?xml version="1.0" encoding="utf-8"?>
+<p:sld xmlns:a="http://schemas.openxmlformats.org/drawingml/2006/main" xmlns:r="http://schemas.openxmlformats.org/officeDocument/2006/relationships" xmlns:p="http://schemas.openxmlformats.org/presentationml/2006/main">
+  <p:cSld>
+    <p:spTree>
+      <p:nvGrpSpPr>
+        <p:cNvPr id="1" name=""/>
+        <p:cNvGrpSpPr/>
+        <p:nvPr/>
+      </p:nvGrpSpPr>
+      <p:grpSpPr>
+        <a:xfrm>
+          <a:off x="0" y="0"/>
+          <a:ext cx="0" cy="0"/>
+          <a:chOff x="0" y="0"/>
+          <a:chExt cx="0" cy="0"/>
+        </a:xfrm>
+      </p:grpSpPr>
+      <p:sp>
+        <p:nvSpPr>
+          <p:cNvPr id="2" name="Title 1">
+            <a:extLst>
+              <a:ext uri="{FF2B5EF4-FFF2-40B4-BE49-F238E27FC236}">
+                <a16:creationId xmlns:a16="http://schemas.microsoft.com/office/drawing/2014/main" id="{D12175E8-3E53-4E88-8F10-CAF7B5494F28}"/>
+              </a:ext>
+            </a:extLst>
+          </p:cNvPr>
+          <p:cNvSpPr>
+            <a:spLocks noGrp="1"/>
+          </p:cNvSpPr>
+          <p:nvPr>
+            <p:ph type="title"/>
+          </p:nvPr>
+        </p:nvSpPr>
+        <p:spPr/>
+        <p:txBody>
+          <a:bodyPr/>
+          <a:lstStyle/>
+          <a:p>
+            <a:r>
+              <a:rPr lang="en-US" dirty="0"/>
+              <a:t>More Motivation for L7</a:t>
+            </a:r>
+          </a:p>
+        </p:txBody>
+      </p:sp>
+      <p:sp>
+        <p:nvSpPr>
+          <p:cNvPr id="3" name="Content Placeholder 2">
+            <a:extLst>
+              <a:ext uri="{FF2B5EF4-FFF2-40B4-BE49-F238E27FC236}">
+                <a16:creationId xmlns:a16="http://schemas.microsoft.com/office/drawing/2014/main" id="{BF6BAA00-E4AB-4F87-827D-56004E5AB839}"/>
+              </a:ext>
+            </a:extLst>
+          </p:cNvPr>
+          <p:cNvSpPr>
+            <a:spLocks noGrp="1"/>
+          </p:cNvSpPr>
+          <p:nvPr>
+            <p:ph idx="1"/>
+          </p:nvPr>
+        </p:nvSpPr>
+        <p:spPr/>
+        <p:txBody>
+          <a:bodyPr/>
+          <a:lstStyle/>
+          <a:p>
+            <a:r>
+              <a:rPr lang="en-US" dirty="0"/>
+              <a:t>In the past decade, need for L7 scanning has increased</a:t>
+            </a:r>
+          </a:p>
+          <a:p>
+            <a:r>
+              <a:rPr lang="en-US" dirty="0"/>
+              <a:t>Consider policy #1 – controlling which services are available</a:t>
+            </a:r>
+          </a:p>
+          <a:p>
+            <a:r>
+              <a:rPr lang="en-US" dirty="0"/>
+              <a:t>Without L7, this can only be enforced by monitoring ports.</a:t>
+            </a:r>
+          </a:p>
+          <a:p>
+            <a:r>
+              <a:rPr lang="en-US" dirty="0"/>
+              <a:t>What stops a bad person from using an unconventional port number?</a:t>
+            </a:r>
+          </a:p>
+          <a:p>
+            <a:r>
+              <a:rPr lang="en-US" dirty="0"/>
+              <a:t>With L7 scanning, can verify the type of traffic</a:t>
+            </a:r>
+          </a:p>
+        </p:txBody>
+      </p:sp>
+    </p:spTree>
+    <p:extLst>
+      <p:ext uri="{BB962C8B-B14F-4D97-AF65-F5344CB8AC3E}">
+        <p14:creationId xmlns:p14="http://schemas.microsoft.com/office/powerpoint/2010/main" val="3316019538"/>
+      </p:ext>
+    </p:extLst>
+  </p:cSld>
+  <p:clrMapOvr>
+    <a:masterClrMapping/>
+  </p:clrMapOvr>
+</p:sld>
+</file>
+
+<file path=ppt/slides/slide37.xml><?xml version="1.0" encoding="utf-8"?>
+<p:sld xmlns:a="http://schemas.openxmlformats.org/drawingml/2006/main" xmlns:r="http://schemas.openxmlformats.org/officeDocument/2006/relationships" xmlns:p="http://schemas.openxmlformats.org/presentationml/2006/main">
+  <p:cSld>
+    <p:spTree>
+      <p:nvGrpSpPr>
+        <p:cNvPr id="1" name=""/>
+        <p:cNvGrpSpPr/>
+        <p:nvPr/>
+      </p:nvGrpSpPr>
+      <p:grpSpPr>
+        <a:xfrm>
+          <a:off x="0" y="0"/>
+          <a:ext cx="0" cy="0"/>
+          <a:chOff x="0" y="0"/>
+          <a:chExt cx="0" cy="0"/>
+        </a:xfrm>
+      </p:grpSpPr>
+      <p:sp>
+        <p:nvSpPr>
+          <p:cNvPr id="2" name="Title 1">
+            <a:extLst>
+              <a:ext uri="{FF2B5EF4-FFF2-40B4-BE49-F238E27FC236}">
+                <a16:creationId xmlns:a16="http://schemas.microsoft.com/office/drawing/2014/main" id="{39B75B86-A3FD-4292-9B5D-D75B0D6F2EDD}"/>
+              </a:ext>
+            </a:extLst>
+          </p:cNvPr>
+          <p:cNvSpPr>
+            <a:spLocks noGrp="1"/>
+          </p:cNvSpPr>
+          <p:nvPr>
+            <p:ph type="title"/>
+          </p:nvPr>
+        </p:nvSpPr>
+        <p:spPr/>
+        <p:txBody>
+          <a:bodyPr/>
+          <a:lstStyle/>
+          <a:p>
+            <a:r>
+              <a:rPr lang="en-US" dirty="0"/>
+              <a:t>Tunnels</a:t>
+            </a:r>
+          </a:p>
+        </p:txBody>
+      </p:sp>
+      <p:sp>
+        <p:nvSpPr>
+          <p:cNvPr id="3" name="Content Placeholder 2">
+            <a:extLst>
+              <a:ext uri="{FF2B5EF4-FFF2-40B4-BE49-F238E27FC236}">
+                <a16:creationId xmlns:a16="http://schemas.microsoft.com/office/drawing/2014/main" id="{98A70359-41A4-47C0-A1EE-F3512183804D}"/>
+              </a:ext>
+            </a:extLst>
+          </p:cNvPr>
+          <p:cNvSpPr>
+            <a:spLocks noGrp="1"/>
+          </p:cNvSpPr>
+          <p:nvPr>
+            <p:ph idx="1"/>
+          </p:nvPr>
+        </p:nvSpPr>
+        <p:spPr/>
+        <p:txBody>
+          <a:bodyPr/>
+          <a:lstStyle/>
+          <a:p>
+            <a:r>
+              <a:rPr lang="en-US" dirty="0"/>
+              <a:t>In the arms race, bad actors wrap one kind of traffic in another</a:t>
+            </a:r>
+          </a:p>
+          <a:p>
+            <a:r>
+              <a:rPr lang="en-US" dirty="0"/>
+              <a:t>Unsurprisingly, HTTP is popular</a:t>
+            </a:r>
+          </a:p>
+          <a:p>
+            <a:r>
+              <a:rPr lang="en-US" dirty="0"/>
+              <a:t>Modern firewalls can unpack the tunnel to see what’s inside.</a:t>
+            </a:r>
+          </a:p>
+          <a:p>
+            <a:r>
+              <a:rPr lang="en-US" dirty="0"/>
+              <a:t>One exception: encrypted tunnels (TLS/SSH)</a:t>
+            </a:r>
+          </a:p>
+          <a:p>
+            <a:r>
+              <a:rPr lang="en-US" dirty="0"/>
+              <a:t>Can’t see inside without “visibility” (we’ll discuss later)</a:t>
+            </a:r>
+          </a:p>
+        </p:txBody>
+      </p:sp>
+    </p:spTree>
+    <p:extLst>
+      <p:ext uri="{BB962C8B-B14F-4D97-AF65-F5344CB8AC3E}">
+        <p14:creationId xmlns:p14="http://schemas.microsoft.com/office/powerpoint/2010/main" val="2264731584"/>
+      </p:ext>
+    </p:extLst>
+  </p:cSld>
+  <p:clrMapOvr>
+    <a:masterClrMapping/>
+  </p:clrMapOvr>
+</p:sld>
+</file>
+
+<file path=ppt/slides/slide38.xml><?xml version="1.0" encoding="utf-8"?>
+<p:sld xmlns:a="http://schemas.openxmlformats.org/drawingml/2006/main" xmlns:r="http://schemas.openxmlformats.org/officeDocument/2006/relationships" xmlns:p="http://schemas.openxmlformats.org/presentationml/2006/main">
+  <p:cSld>
+    <p:spTree>
+      <p:nvGrpSpPr>
+        <p:cNvPr id="1" name=""/>
+        <p:cNvGrpSpPr/>
+        <p:nvPr/>
+      </p:nvGrpSpPr>
+      <p:grpSpPr>
+        <a:xfrm>
+          <a:off x="0" y="0"/>
+          <a:ext cx="0" cy="0"/>
+          <a:chOff x="0" y="0"/>
+          <a:chExt cx="0" cy="0"/>
+        </a:xfrm>
+      </p:grpSpPr>
+      <p:sp>
+        <p:nvSpPr>
+          <p:cNvPr id="2" name="Title 1"/>
+          <p:cNvSpPr>
+            <a:spLocks noGrp="1"/>
+          </p:cNvSpPr>
+          <p:nvPr>
+            <p:ph type="title"/>
+          </p:nvPr>
+        </p:nvSpPr>
+        <p:spPr/>
+        <p:txBody>
+          <a:bodyPr/>
+          <a:lstStyle/>
+          <a:p>
+            <a:r>
+              <a:rPr lang="en-US" dirty="0"/>
+              <a:t>IDS: Mitigation and Future </a:t>
+            </a:r>
+            <a:r>
+              <a:rPr lang="en-US" dirty="0" err="1"/>
+              <a:t>PRevention</a:t>
+            </a:r>
+            <a:endParaRPr lang="en-US" dirty="0"/>
+          </a:p>
+        </p:txBody>
+      </p:sp>
+      <p:sp>
+        <p:nvSpPr>
+          <p:cNvPr id="3" name="Content Placeholder 2"/>
+          <p:cNvSpPr>
+            <a:spLocks noGrp="1"/>
+          </p:cNvSpPr>
+          <p:nvPr>
+            <p:ph sz="quarter" idx="13"/>
+          </p:nvPr>
+        </p:nvSpPr>
+        <p:spPr/>
+        <p:txBody>
+          <a:bodyPr/>
+          <a:lstStyle/>
+          <a:p>
+            <a:r>
+              <a:rPr lang="en-US" dirty="0"/>
+              <a:t>IDS stands for Intrusion Detection System</a:t>
+            </a:r>
+          </a:p>
+          <a:p>
+            <a:r>
+              <a:rPr lang="en-US" dirty="0"/>
+              <a:t>IPS is Intrusion Prevention System</a:t>
+            </a:r>
+          </a:p>
+          <a:p>
+            <a:r>
+              <a:rPr lang="en-US" dirty="0"/>
+              <a:t>IDS is far more common because IPS is just too hard (false positive and false negatives)</a:t>
+            </a:r>
+          </a:p>
+          <a:p>
+            <a:r>
+              <a:rPr lang="en-US" dirty="0"/>
+              <a:t>IDS assumes the attacker has already won</a:t>
+            </a:r>
+          </a:p>
+          <a:p>
+            <a:pPr lvl="1"/>
+            <a:r>
+              <a:rPr lang="en-US" dirty="0"/>
+              <a:t>The attacker has already succeeded in his objective and left (forensics)</a:t>
+            </a:r>
+          </a:p>
+          <a:p>
+            <a:pPr lvl="1"/>
+            <a:r>
+              <a:rPr lang="en-US" dirty="0"/>
+              <a:t>The attacker is in the system, but still moving toward a higher target (mitigation)</a:t>
+            </a:r>
+          </a:p>
+        </p:txBody>
+      </p:sp>
+    </p:spTree>
+    <p:extLst>
+      <p:ext uri="{BB962C8B-B14F-4D97-AF65-F5344CB8AC3E}">
+        <p14:creationId xmlns:p14="http://schemas.microsoft.com/office/powerpoint/2010/main" val="1112725946"/>
+      </p:ext>
+    </p:extLst>
+  </p:cSld>
+  <p:clrMapOvr>
+    <a:masterClrMapping/>
+  </p:clrMapOvr>
+</p:sld>
+</file>
+
+<file path=ppt/slides/slide39.xml><?xml version="1.0" encoding="utf-8"?>
+<p:sld xmlns:a="http://schemas.openxmlformats.org/drawingml/2006/main" xmlns:r="http://schemas.openxmlformats.org/officeDocument/2006/relationships" xmlns:p="http://schemas.openxmlformats.org/presentationml/2006/main">
+  <p:cSld>
+    <p:spTree>
+      <p:nvGrpSpPr>
+        <p:cNvPr id="1" name=""/>
+        <p:cNvGrpSpPr/>
+        <p:nvPr/>
+      </p:nvGrpSpPr>
+      <p:grpSpPr>
+        <a:xfrm>
+          <a:off x="0" y="0"/>
+          <a:ext cx="0" cy="0"/>
+          <a:chOff x="0" y="0"/>
+          <a:chExt cx="0" cy="0"/>
+        </a:xfrm>
+      </p:grpSpPr>
+      <p:sp>
+        <p:nvSpPr>
+          <p:cNvPr id="2" name="Title 1"/>
+          <p:cNvSpPr>
+            <a:spLocks noGrp="1"/>
+          </p:cNvSpPr>
+          <p:nvPr>
+            <p:ph type="title"/>
+          </p:nvPr>
+        </p:nvSpPr>
+        <p:spPr/>
+        <p:txBody>
+          <a:bodyPr/>
+          <a:lstStyle/>
+          <a:p>
+            <a:r>
+              <a:rPr lang="en-US" dirty="0"/>
+              <a:t>Signs of Bad Behavior</a:t>
+            </a:r>
+          </a:p>
+        </p:txBody>
+      </p:sp>
+      <p:sp>
+        <p:nvSpPr>
+          <p:cNvPr id="3" name="Content Placeholder 2"/>
+          <p:cNvSpPr>
+            <a:spLocks noGrp="1"/>
+          </p:cNvSpPr>
+          <p:nvPr>
+            <p:ph sz="quarter" idx="13"/>
+          </p:nvPr>
+        </p:nvSpPr>
+        <p:spPr/>
+        <p:txBody>
+          <a:bodyPr/>
+          <a:lstStyle/>
+          <a:p>
+            <a:r>
+              <a:rPr lang="en-US" dirty="0"/>
+              <a:t>Anomalies: unusual network traffic</a:t>
+            </a:r>
+          </a:p>
+          <a:p>
+            <a:pPr lvl="1"/>
+            <a:r>
+              <a:rPr lang="en-US" dirty="0"/>
+              <a:t>Port scanning (recon)</a:t>
+            </a:r>
+          </a:p>
+          <a:p>
+            <a:pPr lvl="1"/>
+            <a:r>
+              <a:rPr lang="en-US" dirty="0"/>
+              <a:t>Unusually large data transmissions (buffer overflow, </a:t>
+            </a:r>
+            <a:r>
+              <a:rPr lang="en-US" dirty="0" err="1"/>
+              <a:t>etc</a:t>
+            </a:r>
+            <a:r>
+              <a:rPr lang="en-US" dirty="0"/>
+              <a:t>)</a:t>
+            </a:r>
+          </a:p>
+          <a:p>
+            <a:pPr lvl="1"/>
+            <a:r>
+              <a:rPr lang="en-US" dirty="0"/>
+              <a:t>Unexpected traffic between machines</a:t>
+            </a:r>
+          </a:p>
+          <a:p>
+            <a:r>
+              <a:rPr lang="en-US" dirty="0"/>
+              <a:t>Surprisingly, this is still very much signature based</a:t>
+            </a:r>
+          </a:p>
+          <a:p>
+            <a:r>
+              <a:rPr lang="en-US" dirty="0"/>
+              <a:t>Various products have attempted to do statistics modeling but usually too noisy</a:t>
+            </a:r>
+          </a:p>
+        </p:txBody>
+      </p:sp>
+    </p:spTree>
+    <p:extLst>
+      <p:ext uri="{BB962C8B-B14F-4D97-AF65-F5344CB8AC3E}">
+        <p14:creationId xmlns:p14="http://schemas.microsoft.com/office/powerpoint/2010/main" val="4284018520"/>
+      </p:ext>
+    </p:extLst>
+  </p:cSld>
+  <p:clrMapOvr>
+    <a:masterClrMapping/>
+  </p:clrMapOvr>
+</p:sld>
+</file>
+
 <file path=ppt/slides/slide4.xml><?xml version="1.0" encoding="utf-8"?>
 <p:sld xmlns:a="http://schemas.openxmlformats.org/drawingml/2006/main" xmlns:r="http://schemas.openxmlformats.org/officeDocument/2006/relationships" xmlns:p="http://schemas.openxmlformats.org/presentationml/2006/main">
   <p:cSld>
@@ -7388,6 +9375,1071 @@
     <p:extLst>
       <p:ext uri="{BB962C8B-B14F-4D97-AF65-F5344CB8AC3E}">
         <p14:creationId xmlns:p14="http://schemas.microsoft.com/office/powerpoint/2010/main" val="4193451275"/>
+      </p:ext>
+    </p:extLst>
+  </p:cSld>
+  <p:clrMapOvr>
+    <a:masterClrMapping/>
+  </p:clrMapOvr>
+</p:sld>
+</file>
+
+<file path=ppt/slides/slide40.xml><?xml version="1.0" encoding="utf-8"?>
+<p:sld xmlns:a="http://schemas.openxmlformats.org/drawingml/2006/main" xmlns:r="http://schemas.openxmlformats.org/officeDocument/2006/relationships" xmlns:p="http://schemas.openxmlformats.org/presentationml/2006/main">
+  <p:cSld>
+    <p:spTree>
+      <p:nvGrpSpPr>
+        <p:cNvPr id="1" name=""/>
+        <p:cNvGrpSpPr/>
+        <p:nvPr/>
+      </p:nvGrpSpPr>
+      <p:grpSpPr>
+        <a:xfrm>
+          <a:off x="0" y="0"/>
+          <a:ext cx="0" cy="0"/>
+          <a:chOff x="0" y="0"/>
+          <a:chExt cx="0" cy="0"/>
+        </a:xfrm>
+      </p:grpSpPr>
+      <p:sp>
+        <p:nvSpPr>
+          <p:cNvPr id="2" name="Title 1"/>
+          <p:cNvSpPr>
+            <a:spLocks noGrp="1"/>
+          </p:cNvSpPr>
+          <p:nvPr>
+            <p:ph type="title"/>
+          </p:nvPr>
+        </p:nvSpPr>
+        <p:spPr/>
+        <p:txBody>
+          <a:bodyPr/>
+          <a:lstStyle/>
+          <a:p>
+            <a:r>
+              <a:rPr lang="en-US" dirty="0"/>
+              <a:t>IDS Types</a:t>
+            </a:r>
+          </a:p>
+        </p:txBody>
+      </p:sp>
+      <p:sp>
+        <p:nvSpPr>
+          <p:cNvPr id="3" name="Content Placeholder 2"/>
+          <p:cNvSpPr>
+            <a:spLocks noGrp="1"/>
+          </p:cNvSpPr>
+          <p:nvPr>
+            <p:ph sz="quarter" idx="13"/>
+          </p:nvPr>
+        </p:nvSpPr>
+        <p:spPr/>
+        <p:txBody>
+          <a:bodyPr/>
+          <a:lstStyle/>
+          <a:p>
+            <a:r>
+              <a:rPr lang="en-US" dirty="0"/>
+              <a:t>Network Based IDS (NIDS)</a:t>
+            </a:r>
+          </a:p>
+          <a:p>
+            <a:pPr lvl="1"/>
+            <a:r>
+              <a:rPr lang="en-US" dirty="0"/>
+              <a:t>Monitor traffic on the network (often using the gateways/routers)</a:t>
+            </a:r>
+          </a:p>
+          <a:p>
+            <a:r>
+              <a:rPr lang="en-US" dirty="0"/>
+              <a:t>Host Based IDS (HIDS)</a:t>
+            </a:r>
+          </a:p>
+          <a:p>
+            <a:pPr lvl="1"/>
+            <a:r>
+              <a:rPr lang="en-US" dirty="0"/>
+              <a:t>Monitor traffic received at a host, and the effect thereof</a:t>
+            </a:r>
+          </a:p>
+          <a:p>
+            <a:pPr lvl="1"/>
+            <a:r>
+              <a:rPr lang="en-US" dirty="0"/>
+              <a:t>Sometimes helpful in simply monitoring the encrypted traffic</a:t>
+            </a:r>
+          </a:p>
+          <a:p>
+            <a:r>
+              <a:rPr lang="en-US" dirty="0"/>
+              <a:t>Hybrid systems</a:t>
+            </a:r>
+          </a:p>
+          <a:p>
+            <a:pPr lvl="1"/>
+            <a:r>
+              <a:rPr lang="en-US" dirty="0"/>
+              <a:t>Deploy host components and network </a:t>
+            </a:r>
+            <a:r>
+              <a:rPr lang="en-US" dirty="0" err="1"/>
+              <a:t>componets</a:t>
+            </a:r>
+            <a:endParaRPr lang="en-US" dirty="0"/>
+          </a:p>
+          <a:p>
+            <a:pPr lvl="1"/>
+            <a:r>
+              <a:rPr lang="en-US" dirty="0"/>
+              <a:t>Report all data back to a central server/dashboard</a:t>
+            </a:r>
+          </a:p>
+        </p:txBody>
+      </p:sp>
+    </p:spTree>
+    <p:extLst>
+      <p:ext uri="{BB962C8B-B14F-4D97-AF65-F5344CB8AC3E}">
+        <p14:creationId xmlns:p14="http://schemas.microsoft.com/office/powerpoint/2010/main" val="4101648428"/>
+      </p:ext>
+    </p:extLst>
+  </p:cSld>
+  <p:clrMapOvr>
+    <a:masterClrMapping/>
+  </p:clrMapOvr>
+</p:sld>
+</file>
+
+<file path=ppt/slides/slide41.xml><?xml version="1.0" encoding="utf-8"?>
+<p:sld xmlns:a="http://schemas.openxmlformats.org/drawingml/2006/main" xmlns:r="http://schemas.openxmlformats.org/officeDocument/2006/relationships" xmlns:p="http://schemas.openxmlformats.org/presentationml/2006/main">
+  <p:cSld>
+    <p:spTree>
+      <p:nvGrpSpPr>
+        <p:cNvPr id="1" name=""/>
+        <p:cNvGrpSpPr/>
+        <p:nvPr/>
+      </p:nvGrpSpPr>
+      <p:grpSpPr>
+        <a:xfrm>
+          <a:off x="0" y="0"/>
+          <a:ext cx="0" cy="0"/>
+          <a:chOff x="0" y="0"/>
+          <a:chExt cx="0" cy="0"/>
+        </a:xfrm>
+      </p:grpSpPr>
+      <p:sp>
+        <p:nvSpPr>
+          <p:cNvPr id="2" name="Title 1"/>
+          <p:cNvSpPr>
+            <a:spLocks noGrp="1"/>
+          </p:cNvSpPr>
+          <p:nvPr>
+            <p:ph type="title"/>
+          </p:nvPr>
+        </p:nvSpPr>
+        <p:spPr/>
+        <p:txBody>
+          <a:bodyPr/>
+          <a:lstStyle/>
+          <a:p>
+            <a:r>
+              <a:rPr lang="en-US" dirty="0"/>
+              <a:t>Honeypots</a:t>
+            </a:r>
+          </a:p>
+        </p:txBody>
+      </p:sp>
+      <p:sp>
+        <p:nvSpPr>
+          <p:cNvPr id="3" name="Content Placeholder 2"/>
+          <p:cNvSpPr>
+            <a:spLocks noGrp="1"/>
+          </p:cNvSpPr>
+          <p:nvPr>
+            <p:ph sz="quarter" idx="13"/>
+          </p:nvPr>
+        </p:nvSpPr>
+        <p:spPr/>
+        <p:txBody>
+          <a:bodyPr/>
+          <a:lstStyle/>
+          <a:p>
+            <a:r>
+              <a:rPr lang="en-US" dirty="0"/>
+              <a:t>An interesting IDS component</a:t>
+            </a:r>
+          </a:p>
+          <a:p>
+            <a:r>
+              <a:rPr lang="en-US" dirty="0"/>
+              <a:t>Create a fake system to draw attacker attention</a:t>
+            </a:r>
+          </a:p>
+          <a:p>
+            <a:r>
+              <a:rPr lang="en-US" dirty="0"/>
+              <a:t>Introduces components whose entire operation is an anomaly </a:t>
+            </a:r>
+          </a:p>
+          <a:p>
+            <a:endParaRPr lang="en-US" dirty="0"/>
+          </a:p>
+        </p:txBody>
+      </p:sp>
+    </p:spTree>
+    <p:extLst>
+      <p:ext uri="{BB962C8B-B14F-4D97-AF65-F5344CB8AC3E}">
+        <p14:creationId xmlns:p14="http://schemas.microsoft.com/office/powerpoint/2010/main" val="1858893797"/>
+      </p:ext>
+    </p:extLst>
+  </p:cSld>
+  <p:clrMapOvr>
+    <a:masterClrMapping/>
+  </p:clrMapOvr>
+</p:sld>
+</file>
+
+<file path=ppt/slides/slide42.xml><?xml version="1.0" encoding="utf-8"?>
+<p:sld xmlns:a="http://schemas.openxmlformats.org/drawingml/2006/main" xmlns:r="http://schemas.openxmlformats.org/officeDocument/2006/relationships" xmlns:p="http://schemas.openxmlformats.org/presentationml/2006/main">
+  <p:cSld>
+    <p:spTree>
+      <p:nvGrpSpPr>
+        <p:cNvPr id="1" name=""/>
+        <p:cNvGrpSpPr/>
+        <p:nvPr/>
+      </p:nvGrpSpPr>
+      <p:grpSpPr>
+        <a:xfrm>
+          <a:off x="0" y="0"/>
+          <a:ext cx="0" cy="0"/>
+          <a:chOff x="0" y="0"/>
+          <a:chExt cx="0" cy="0"/>
+        </a:xfrm>
+      </p:grpSpPr>
+      <p:sp>
+        <p:nvSpPr>
+          <p:cNvPr id="2" name="Title 1"/>
+          <p:cNvSpPr>
+            <a:spLocks noGrp="1"/>
+          </p:cNvSpPr>
+          <p:nvPr>
+            <p:ph type="title"/>
+          </p:nvPr>
+        </p:nvSpPr>
+        <p:spPr/>
+        <p:txBody>
+          <a:bodyPr/>
+          <a:lstStyle/>
+          <a:p>
+            <a:r>
+              <a:rPr lang="en-US" dirty="0"/>
+              <a:t>Types of Honeypots</a:t>
+            </a:r>
+          </a:p>
+        </p:txBody>
+      </p:sp>
+      <p:sp>
+        <p:nvSpPr>
+          <p:cNvPr id="3" name="Content Placeholder 2"/>
+          <p:cNvSpPr>
+            <a:spLocks noGrp="1"/>
+          </p:cNvSpPr>
+          <p:nvPr>
+            <p:ph sz="quarter" idx="13"/>
+          </p:nvPr>
+        </p:nvSpPr>
+        <p:spPr/>
+        <p:txBody>
+          <a:bodyPr/>
+          <a:lstStyle/>
+          <a:p>
+            <a:r>
+              <a:rPr lang="en-US" dirty="0"/>
+              <a:t>Low Interaction – port only, record traffic</a:t>
+            </a:r>
+          </a:p>
+          <a:p>
+            <a:pPr lvl="1"/>
+            <a:r>
+              <a:rPr lang="en-US" dirty="0"/>
+              <a:t>Purpose: logging</a:t>
+            </a:r>
+          </a:p>
+          <a:p>
+            <a:r>
+              <a:rPr lang="en-US" dirty="0"/>
+              <a:t>Medium Interaction – simulated/emulated service</a:t>
+            </a:r>
+          </a:p>
+          <a:p>
+            <a:pPr lvl="1"/>
+            <a:r>
+              <a:rPr lang="en-US" dirty="0"/>
+              <a:t>Purpose: delay/confuse</a:t>
+            </a:r>
+          </a:p>
+          <a:p>
+            <a:r>
+              <a:rPr lang="en-US" dirty="0"/>
+              <a:t>High Interaction – real services on real computers with real operating systems</a:t>
+            </a:r>
+          </a:p>
+          <a:p>
+            <a:pPr lvl="1"/>
+            <a:r>
+              <a:rPr lang="en-US" dirty="0"/>
+              <a:t>Purpose: maximum analysis of attacker behavior</a:t>
+            </a:r>
+          </a:p>
+          <a:p>
+            <a:r>
+              <a:rPr lang="en-US" dirty="0"/>
+              <a:t>Honeynet – multiple honeypots working together</a:t>
+            </a:r>
+          </a:p>
+          <a:p>
+            <a:r>
+              <a:rPr lang="en-US" dirty="0"/>
+              <a:t>Specialized variants:</a:t>
+            </a:r>
+          </a:p>
+          <a:p>
+            <a:pPr lvl="1"/>
+            <a:r>
+              <a:rPr lang="en-US" dirty="0"/>
+              <a:t>Malware Honeypots</a:t>
+            </a:r>
+          </a:p>
+          <a:p>
+            <a:pPr lvl="1"/>
+            <a:r>
+              <a:rPr lang="en-US" dirty="0"/>
+              <a:t>Spam Honeypots</a:t>
+            </a:r>
+          </a:p>
+        </p:txBody>
+      </p:sp>
+    </p:spTree>
+    <p:extLst>
+      <p:ext uri="{BB962C8B-B14F-4D97-AF65-F5344CB8AC3E}">
+        <p14:creationId xmlns:p14="http://schemas.microsoft.com/office/powerpoint/2010/main" val="2205796112"/>
+      </p:ext>
+    </p:extLst>
+  </p:cSld>
+  <p:clrMapOvr>
+    <a:masterClrMapping/>
+  </p:clrMapOvr>
+</p:sld>
+</file>
+
+<file path=ppt/slides/slide43.xml><?xml version="1.0" encoding="utf-8"?>
+<p:sld xmlns:a="http://schemas.openxmlformats.org/drawingml/2006/main" xmlns:r="http://schemas.openxmlformats.org/officeDocument/2006/relationships" xmlns:p="http://schemas.openxmlformats.org/presentationml/2006/main">
+  <p:cSld>
+    <p:spTree>
+      <p:nvGrpSpPr>
+        <p:cNvPr id="1" name=""/>
+        <p:cNvGrpSpPr/>
+        <p:nvPr/>
+      </p:nvGrpSpPr>
+      <p:grpSpPr>
+        <a:xfrm>
+          <a:off x="0" y="0"/>
+          <a:ext cx="0" cy="0"/>
+          <a:chOff x="0" y="0"/>
+          <a:chExt cx="0" cy="0"/>
+        </a:xfrm>
+      </p:grpSpPr>
+      <p:sp>
+        <p:nvSpPr>
+          <p:cNvPr id="2" name="Title 1"/>
+          <p:cNvSpPr>
+            <a:spLocks noGrp="1"/>
+          </p:cNvSpPr>
+          <p:nvPr>
+            <p:ph type="title"/>
+          </p:nvPr>
+        </p:nvSpPr>
+        <p:spPr/>
+        <p:txBody>
+          <a:bodyPr/>
+          <a:lstStyle/>
+          <a:p>
+            <a:r>
+              <a:rPr lang="en-US" dirty="0"/>
+              <a:t>Deploying Honeypots </a:t>
+            </a:r>
+          </a:p>
+        </p:txBody>
+      </p:sp>
+      <p:sp>
+        <p:nvSpPr>
+          <p:cNvPr id="3" name="Content Placeholder 2"/>
+          <p:cNvSpPr>
+            <a:spLocks noGrp="1"/>
+          </p:cNvSpPr>
+          <p:nvPr>
+            <p:ph sz="quarter" idx="13"/>
+          </p:nvPr>
+        </p:nvSpPr>
+        <p:spPr/>
+        <p:txBody>
+          <a:bodyPr/>
+          <a:lstStyle/>
+          <a:p>
+            <a:r>
+              <a:rPr lang="en-US" dirty="0"/>
+              <a:t>Now part of larger “Enterprise Deception Operations” initiatives</a:t>
+            </a:r>
+          </a:p>
+          <a:p>
+            <a:r>
+              <a:rPr lang="en-US" dirty="0"/>
+              <a:t>Which type of honeypot makes the most sense?</a:t>
+            </a:r>
+          </a:p>
+          <a:p>
+            <a:pPr lvl="1"/>
+            <a:r>
+              <a:rPr lang="en-US" dirty="0"/>
+              <a:t>Perhaps counter-intuitively, “low interaction” for corporate</a:t>
+            </a:r>
+          </a:p>
+          <a:p>
+            <a:pPr lvl="1"/>
+            <a:r>
+              <a:rPr lang="en-US" dirty="0"/>
+              <a:t>“high interaction” for research</a:t>
+            </a:r>
+          </a:p>
+          <a:p>
+            <a:pPr lvl="1"/>
+            <a:r>
+              <a:rPr lang="en-US" dirty="0"/>
+              <a:t>In the corporate world, may be related to SLA (reaction time, not detail matters)</a:t>
+            </a:r>
+          </a:p>
+          <a:p>
+            <a:r>
+              <a:rPr lang="en-US" dirty="0"/>
+              <a:t>But all of this should come back to the security policy, should it not?</a:t>
+            </a:r>
+          </a:p>
+        </p:txBody>
+      </p:sp>
+    </p:spTree>
+    <p:extLst>
+      <p:ext uri="{BB962C8B-B14F-4D97-AF65-F5344CB8AC3E}">
+        <p14:creationId xmlns:p14="http://schemas.microsoft.com/office/powerpoint/2010/main" val="2816335715"/>
+      </p:ext>
+    </p:extLst>
+  </p:cSld>
+  <p:clrMapOvr>
+    <a:masterClrMapping/>
+  </p:clrMapOvr>
+</p:sld>
+</file>
+
+<file path=ppt/slides/slide44.xml><?xml version="1.0" encoding="utf-8"?>
+<p:sld xmlns:a="http://schemas.openxmlformats.org/drawingml/2006/main" xmlns:r="http://schemas.openxmlformats.org/officeDocument/2006/relationships" xmlns:p="http://schemas.openxmlformats.org/presentationml/2006/main">
+  <p:cSld>
+    <p:spTree>
+      <p:nvGrpSpPr>
+        <p:cNvPr id="1" name=""/>
+        <p:cNvGrpSpPr/>
+        <p:nvPr/>
+      </p:nvGrpSpPr>
+      <p:grpSpPr>
+        <a:xfrm>
+          <a:off x="0" y="0"/>
+          <a:ext cx="0" cy="0"/>
+          <a:chOff x="0" y="0"/>
+          <a:chExt cx="0" cy="0"/>
+        </a:xfrm>
+      </p:grpSpPr>
+      <p:sp>
+        <p:nvSpPr>
+          <p:cNvPr id="2" name="Title 1"/>
+          <p:cNvSpPr>
+            <a:spLocks noGrp="1"/>
+          </p:cNvSpPr>
+          <p:nvPr>
+            <p:ph type="title"/>
+          </p:nvPr>
+        </p:nvSpPr>
+        <p:spPr/>
+        <p:txBody>
+          <a:bodyPr/>
+          <a:lstStyle/>
+          <a:p>
+            <a:r>
+              <a:rPr lang="en-US" dirty="0"/>
+              <a:t>IDS and Security Policy</a:t>
+            </a:r>
+          </a:p>
+        </p:txBody>
+      </p:sp>
+      <p:sp>
+        <p:nvSpPr>
+          <p:cNvPr id="3" name="Content Placeholder 2"/>
+          <p:cNvSpPr>
+            <a:spLocks noGrp="1"/>
+          </p:cNvSpPr>
+          <p:nvPr>
+            <p:ph sz="quarter" idx="13"/>
+          </p:nvPr>
+        </p:nvSpPr>
+        <p:spPr/>
+        <p:txBody>
+          <a:bodyPr/>
+          <a:lstStyle/>
+          <a:p>
+            <a:r>
+              <a:rPr lang="en-US" dirty="0"/>
+              <a:t>What policy does IDS (including honeypot) enforce?</a:t>
+            </a:r>
+          </a:p>
+          <a:p>
+            <a:r>
+              <a:rPr lang="en-US" dirty="0"/>
+              <a:t>For many (all?) ideal policies, none. The attacker has already violated a policy.</a:t>
+            </a:r>
+          </a:p>
+          <a:p>
+            <a:r>
+              <a:rPr lang="en-US" dirty="0"/>
+              <a:t>Perhaps you could think of it as a meta-level policy (policies about policies)</a:t>
+            </a:r>
+          </a:p>
+          <a:p>
+            <a:r>
+              <a:rPr lang="en-US" dirty="0"/>
+              <a:t>Or, you could think about it as “enforcement-after-the-fact”</a:t>
+            </a:r>
+          </a:p>
+          <a:p>
+            <a:pPr lvl="1"/>
+            <a:r>
+              <a:rPr lang="en-US" dirty="0"/>
+              <a:t>That is, how quickly can we get back to compliance?</a:t>
+            </a:r>
+          </a:p>
+        </p:txBody>
+      </p:sp>
+    </p:spTree>
+    <p:extLst>
+      <p:ext uri="{BB962C8B-B14F-4D97-AF65-F5344CB8AC3E}">
+        <p14:creationId xmlns:p14="http://schemas.microsoft.com/office/powerpoint/2010/main" val="129201691"/>
+      </p:ext>
+    </p:extLst>
+  </p:cSld>
+  <p:clrMapOvr>
+    <a:masterClrMapping/>
+  </p:clrMapOvr>
+</p:sld>
+</file>
+
+<file path=ppt/slides/slide45.xml><?xml version="1.0" encoding="utf-8"?>
+<p:sld xmlns:a="http://schemas.openxmlformats.org/drawingml/2006/main" xmlns:r="http://schemas.openxmlformats.org/officeDocument/2006/relationships" xmlns:p="http://schemas.openxmlformats.org/presentationml/2006/main">
+  <p:cSld>
+    <p:spTree>
+      <p:nvGrpSpPr>
+        <p:cNvPr id="1" name=""/>
+        <p:cNvGrpSpPr/>
+        <p:nvPr/>
+      </p:nvGrpSpPr>
+      <p:grpSpPr>
+        <a:xfrm>
+          <a:off x="0" y="0"/>
+          <a:ext cx="0" cy="0"/>
+          <a:chOff x="0" y="0"/>
+          <a:chExt cx="0" cy="0"/>
+        </a:xfrm>
+      </p:grpSpPr>
+      <p:sp>
+        <p:nvSpPr>
+          <p:cNvPr id="2" name="Title 1">
+            <a:extLst>
+              <a:ext uri="{FF2B5EF4-FFF2-40B4-BE49-F238E27FC236}">
+                <a16:creationId xmlns:a16="http://schemas.microsoft.com/office/drawing/2014/main" id="{913D1151-954A-44E2-8991-10D98D71241B}"/>
+              </a:ext>
+            </a:extLst>
+          </p:cNvPr>
+          <p:cNvSpPr>
+            <a:spLocks noGrp="1"/>
+          </p:cNvSpPr>
+          <p:nvPr>
+            <p:ph type="title"/>
+          </p:nvPr>
+        </p:nvSpPr>
+        <p:spPr/>
+        <p:txBody>
+          <a:bodyPr/>
+          <a:lstStyle/>
+          <a:p>
+            <a:r>
+              <a:rPr lang="en-US" dirty="0"/>
+              <a:t>Network Architecture: DMZ</a:t>
+            </a:r>
+          </a:p>
+        </p:txBody>
+      </p:sp>
+      <p:pic>
+        <p:nvPicPr>
+          <p:cNvPr id="5" name="Picture 4">
+            <a:extLst>
+              <a:ext uri="{FF2B5EF4-FFF2-40B4-BE49-F238E27FC236}">
+                <a16:creationId xmlns:a16="http://schemas.microsoft.com/office/drawing/2014/main" id="{C2DAAA6F-1281-4FC0-976E-BF9A699996D0}"/>
+              </a:ext>
+            </a:extLst>
+          </p:cNvPr>
+          <p:cNvPicPr>
+            <a:picLocks noChangeAspect="1"/>
+          </p:cNvPicPr>
+          <p:nvPr/>
+        </p:nvPicPr>
+        <p:blipFill>
+          <a:blip r:embed="rId2">
+            <a:extLst>
+              <a:ext uri="{837473B0-CC2E-450A-ABE3-18F120FF3D39}">
+                <a1611:picAttrSrcUrl xmlns:a1611="http://schemas.microsoft.com/office/drawing/2016/11/main" r:id="rId3"/>
+              </a:ext>
+            </a:extLst>
+          </a:blip>
+          <a:stretch>
+            <a:fillRect/>
+          </a:stretch>
+        </p:blipFill>
+        <p:spPr>
+          <a:xfrm>
+            <a:off x="812800" y="2701524"/>
+            <a:ext cx="6087479" cy="2424547"/>
+          </a:xfrm>
+          <a:prstGeom prst="rect">
+            <a:avLst/>
+          </a:prstGeom>
+        </p:spPr>
+      </p:pic>
+      <p:sp>
+        <p:nvSpPr>
+          <p:cNvPr id="6" name="TextBox 5">
+            <a:extLst>
+              <a:ext uri="{FF2B5EF4-FFF2-40B4-BE49-F238E27FC236}">
+                <a16:creationId xmlns:a16="http://schemas.microsoft.com/office/drawing/2014/main" id="{61D0075B-05BE-43E0-83CC-2D610C882DC4}"/>
+              </a:ext>
+            </a:extLst>
+          </p:cNvPr>
+          <p:cNvSpPr txBox="1"/>
+          <p:nvPr/>
+        </p:nvSpPr>
+        <p:spPr>
+          <a:xfrm>
+            <a:off x="812800" y="5257629"/>
+            <a:ext cx="6087479" cy="230832"/>
+          </a:xfrm>
+          <a:prstGeom prst="rect">
+            <a:avLst/>
+          </a:prstGeom>
+          <a:noFill/>
+        </p:spPr>
+        <p:txBody>
+          <a:bodyPr wrap="square" rtlCol="0">
+            <a:spAutoFit/>
+          </a:bodyPr>
+          <a:lstStyle/>
+          <a:p>
+            <a:r>
+              <a:rPr lang="en-US" sz="900">
+                <a:hlinkClick r:id="rId3" tooltip="http://serverfault.com/questions/489149/should-i-dual-home-our-webservers-dmz-internal-network-or-just-do-1-to-1-nat"/>
+              </a:rPr>
+              <a:t>This Photo</a:t>
+            </a:r>
+            <a:r>
+              <a:rPr lang="en-US" sz="900"/>
+              <a:t> by Unknown Author is licensed under </a:t>
+            </a:r>
+            <a:r>
+              <a:rPr lang="en-US" sz="900">
+                <a:hlinkClick r:id="rId4" tooltip="https://creativecommons.org/licenses/by-sa/3.0/"/>
+              </a:rPr>
+              <a:t>CC BY-SA</a:t>
+            </a:r>
+            <a:endParaRPr lang="en-US" sz="900"/>
+          </a:p>
+        </p:txBody>
+      </p:sp>
+      <p:pic>
+        <p:nvPicPr>
+          <p:cNvPr id="8" name="Picture 7">
+            <a:extLst>
+              <a:ext uri="{FF2B5EF4-FFF2-40B4-BE49-F238E27FC236}">
+                <a16:creationId xmlns:a16="http://schemas.microsoft.com/office/drawing/2014/main" id="{35E2F596-C021-4A14-B1F3-F9AC520A5BE1}"/>
+              </a:ext>
+            </a:extLst>
+          </p:cNvPr>
+          <p:cNvPicPr>
+            <a:picLocks noChangeAspect="1"/>
+          </p:cNvPicPr>
+          <p:nvPr/>
+        </p:nvPicPr>
+        <p:blipFill>
+          <a:blip r:embed="rId5">
+            <a:extLst>
+              <a:ext uri="{837473B0-CC2E-450A-ABE3-18F120FF3D39}">
+                <a1611:picAttrSrcUrl xmlns:a1611="http://schemas.microsoft.com/office/drawing/2016/11/main" r:id="rId6"/>
+              </a:ext>
+            </a:extLst>
+          </a:blip>
+          <a:stretch>
+            <a:fillRect/>
+          </a:stretch>
+        </p:blipFill>
+        <p:spPr>
+          <a:xfrm>
+            <a:off x="7302481" y="2701524"/>
+            <a:ext cx="4203194" cy="2601080"/>
+          </a:xfrm>
+          <a:prstGeom prst="rect">
+            <a:avLst/>
+          </a:prstGeom>
+        </p:spPr>
+      </p:pic>
+      <p:sp>
+        <p:nvSpPr>
+          <p:cNvPr id="9" name="TextBox 8">
+            <a:extLst>
+              <a:ext uri="{FF2B5EF4-FFF2-40B4-BE49-F238E27FC236}">
+                <a16:creationId xmlns:a16="http://schemas.microsoft.com/office/drawing/2014/main" id="{9092CDC7-F51E-4514-8B12-8B1958FF11B6}"/>
+              </a:ext>
+            </a:extLst>
+          </p:cNvPr>
+          <p:cNvSpPr txBox="1"/>
+          <p:nvPr/>
+        </p:nvSpPr>
+        <p:spPr>
+          <a:xfrm>
+            <a:off x="7411877" y="5381176"/>
+            <a:ext cx="4093798" cy="230832"/>
+          </a:xfrm>
+          <a:prstGeom prst="rect">
+            <a:avLst/>
+          </a:prstGeom>
+          <a:noFill/>
+        </p:spPr>
+        <p:txBody>
+          <a:bodyPr wrap="square" rtlCol="0">
+            <a:spAutoFit/>
+          </a:bodyPr>
+          <a:lstStyle/>
+          <a:p>
+            <a:r>
+              <a:rPr lang="en-US" sz="900">
+                <a:hlinkClick r:id="rId6" tooltip="https://commons.wikimedia.org/wiki/File:DMZ_network_diagram_2.png"/>
+              </a:rPr>
+              <a:t>This Photo</a:t>
+            </a:r>
+            <a:r>
+              <a:rPr lang="en-US" sz="900"/>
+              <a:t> by Unknown Author is licensed under </a:t>
+            </a:r>
+            <a:r>
+              <a:rPr lang="en-US" sz="900">
+                <a:hlinkClick r:id="rId4" tooltip="https://creativecommons.org/licenses/by-sa/3.0/"/>
+              </a:rPr>
+              <a:t>CC BY-SA</a:t>
+            </a:r>
+            <a:endParaRPr lang="en-US" sz="900"/>
+          </a:p>
+        </p:txBody>
+      </p:sp>
+      <p:sp>
+        <p:nvSpPr>
+          <p:cNvPr id="10" name="TextBox 9">
+            <a:extLst>
+              <a:ext uri="{FF2B5EF4-FFF2-40B4-BE49-F238E27FC236}">
+                <a16:creationId xmlns:a16="http://schemas.microsoft.com/office/drawing/2014/main" id="{7F6E914B-0684-4C04-9C81-79C211BE07D7}"/>
+              </a:ext>
+            </a:extLst>
+          </p:cNvPr>
+          <p:cNvSpPr txBox="1"/>
+          <p:nvPr/>
+        </p:nvSpPr>
+        <p:spPr>
+          <a:xfrm>
+            <a:off x="4946621" y="6040625"/>
+            <a:ext cx="3036409" cy="369332"/>
+          </a:xfrm>
+          <a:prstGeom prst="rect">
+            <a:avLst/>
+          </a:prstGeom>
+          <a:noFill/>
+        </p:spPr>
+        <p:txBody>
+          <a:bodyPr wrap="none" rtlCol="0">
+            <a:spAutoFit/>
+          </a:bodyPr>
+          <a:lstStyle/>
+          <a:p>
+            <a:r>
+              <a:rPr lang="en-US" b="1" dirty="0"/>
+              <a:t>POLICY ENFORCEMENT</a:t>
+            </a:r>
+          </a:p>
+        </p:txBody>
+      </p:sp>
+      <p:sp>
+        <p:nvSpPr>
+          <p:cNvPr id="11" name="Arrow: Up 10">
+            <a:extLst>
+              <a:ext uri="{FF2B5EF4-FFF2-40B4-BE49-F238E27FC236}">
+                <a16:creationId xmlns:a16="http://schemas.microsoft.com/office/drawing/2014/main" id="{D0EF8EBF-27AD-40E9-B918-AAF9C4BFC12E}"/>
+              </a:ext>
+            </a:extLst>
+          </p:cNvPr>
+          <p:cNvSpPr/>
+          <p:nvPr/>
+        </p:nvSpPr>
+        <p:spPr>
+          <a:xfrm rot="18691555">
+            <a:off x="3639336" y="3419544"/>
+            <a:ext cx="484632" cy="3060318"/>
+          </a:xfrm>
+          <a:prstGeom prst="upArrow">
+            <a:avLst/>
+          </a:prstGeom>
+        </p:spPr>
+        <p:style>
+          <a:lnRef idx="2">
+            <a:schemeClr val="accent1">
+              <a:shade val="50000"/>
+            </a:schemeClr>
+          </a:lnRef>
+          <a:fillRef idx="1">
+            <a:schemeClr val="accent1"/>
+          </a:fillRef>
+          <a:effectRef idx="0">
+            <a:schemeClr val="accent1"/>
+          </a:effectRef>
+          <a:fontRef idx="minor">
+            <a:schemeClr val="lt1"/>
+          </a:fontRef>
+        </p:style>
+        <p:txBody>
+          <a:bodyPr rtlCol="0" anchor="ctr"/>
+          <a:lstStyle/>
+          <a:p>
+            <a:pPr algn="ctr"/>
+            <a:endParaRPr lang="en-US"/>
+          </a:p>
+        </p:txBody>
+      </p:sp>
+      <p:sp>
+        <p:nvSpPr>
+          <p:cNvPr id="12" name="Arrow: Up 11">
+            <a:extLst>
+              <a:ext uri="{FF2B5EF4-FFF2-40B4-BE49-F238E27FC236}">
+                <a16:creationId xmlns:a16="http://schemas.microsoft.com/office/drawing/2014/main" id="{6D5FB472-2A73-4C93-A4F8-ECD5E5FA3B54}"/>
+              </a:ext>
+            </a:extLst>
+          </p:cNvPr>
+          <p:cNvSpPr/>
+          <p:nvPr/>
+        </p:nvSpPr>
+        <p:spPr>
+          <a:xfrm rot="20953221">
+            <a:off x="5164135" y="3601988"/>
+            <a:ext cx="484632" cy="2371672"/>
+          </a:xfrm>
+          <a:prstGeom prst="upArrow">
+            <a:avLst/>
+          </a:prstGeom>
+        </p:spPr>
+        <p:style>
+          <a:lnRef idx="2">
+            <a:schemeClr val="accent1">
+              <a:shade val="50000"/>
+            </a:schemeClr>
+          </a:lnRef>
+          <a:fillRef idx="1">
+            <a:schemeClr val="accent1"/>
+          </a:fillRef>
+          <a:effectRef idx="0">
+            <a:schemeClr val="accent1"/>
+          </a:effectRef>
+          <a:fontRef idx="minor">
+            <a:schemeClr val="lt1"/>
+          </a:fontRef>
+        </p:style>
+        <p:txBody>
+          <a:bodyPr rtlCol="0" anchor="ctr"/>
+          <a:lstStyle/>
+          <a:p>
+            <a:pPr algn="ctr"/>
+            <a:endParaRPr lang="en-US"/>
+          </a:p>
+        </p:txBody>
+      </p:sp>
+      <p:sp>
+        <p:nvSpPr>
+          <p:cNvPr id="13" name="Arrow: Up 12">
+            <a:extLst>
+              <a:ext uri="{FF2B5EF4-FFF2-40B4-BE49-F238E27FC236}">
+                <a16:creationId xmlns:a16="http://schemas.microsoft.com/office/drawing/2014/main" id="{2AC45D63-AF19-419B-B243-2CE803DDBD03}"/>
+              </a:ext>
+            </a:extLst>
+          </p:cNvPr>
+          <p:cNvSpPr/>
+          <p:nvPr/>
+        </p:nvSpPr>
+        <p:spPr>
+          <a:xfrm rot="4039760">
+            <a:off x="7575148" y="3722530"/>
+            <a:ext cx="484632" cy="3236498"/>
+          </a:xfrm>
+          <a:prstGeom prst="upArrow">
+            <a:avLst/>
+          </a:prstGeom>
+        </p:spPr>
+        <p:style>
+          <a:lnRef idx="2">
+            <a:schemeClr val="accent1">
+              <a:shade val="50000"/>
+            </a:schemeClr>
+          </a:lnRef>
+          <a:fillRef idx="1">
+            <a:schemeClr val="accent1"/>
+          </a:fillRef>
+          <a:effectRef idx="0">
+            <a:schemeClr val="accent1"/>
+          </a:effectRef>
+          <a:fontRef idx="minor">
+            <a:schemeClr val="lt1"/>
+          </a:fontRef>
+        </p:style>
+        <p:txBody>
+          <a:bodyPr rtlCol="0" anchor="ctr"/>
+          <a:lstStyle/>
+          <a:p>
+            <a:pPr algn="ctr"/>
+            <a:endParaRPr lang="en-US"/>
+          </a:p>
+        </p:txBody>
+      </p:sp>
+    </p:spTree>
+    <p:extLst>
+      <p:ext uri="{BB962C8B-B14F-4D97-AF65-F5344CB8AC3E}">
+        <p14:creationId xmlns:p14="http://schemas.microsoft.com/office/powerpoint/2010/main" val="4114062745"/>
+      </p:ext>
+    </p:extLst>
+  </p:cSld>
+  <p:clrMapOvr>
+    <a:masterClrMapping/>
+  </p:clrMapOvr>
+</p:sld>
+</file>
+
+<file path=ppt/slides/slide46.xml><?xml version="1.0" encoding="utf-8"?>
+<p:sld xmlns:a="http://schemas.openxmlformats.org/drawingml/2006/main" xmlns:r="http://schemas.openxmlformats.org/officeDocument/2006/relationships" xmlns:p="http://schemas.openxmlformats.org/presentationml/2006/main">
+  <p:cSld>
+    <p:spTree>
+      <p:nvGrpSpPr>
+        <p:cNvPr id="1" name=""/>
+        <p:cNvGrpSpPr/>
+        <p:nvPr/>
+      </p:nvGrpSpPr>
+      <p:grpSpPr>
+        <a:xfrm>
+          <a:off x="0" y="0"/>
+          <a:ext cx="0" cy="0"/>
+          <a:chOff x="0" y="0"/>
+          <a:chExt cx="0" cy="0"/>
+        </a:xfrm>
+      </p:grpSpPr>
+      <p:sp>
+        <p:nvSpPr>
+          <p:cNvPr id="2" name="Title 1">
+            <a:extLst>
+              <a:ext uri="{FF2B5EF4-FFF2-40B4-BE49-F238E27FC236}">
+                <a16:creationId xmlns:a16="http://schemas.microsoft.com/office/drawing/2014/main" id="{FBD044C5-9921-4E83-A008-2535BC58100E}"/>
+              </a:ext>
+            </a:extLst>
+          </p:cNvPr>
+          <p:cNvSpPr>
+            <a:spLocks noGrp="1"/>
+          </p:cNvSpPr>
+          <p:nvPr>
+            <p:ph type="title"/>
+          </p:nvPr>
+        </p:nvSpPr>
+        <p:spPr/>
+        <p:txBody>
+          <a:bodyPr/>
+          <a:lstStyle/>
+          <a:p>
+            <a:r>
+              <a:rPr lang="en-US" dirty="0"/>
+              <a:t>The Future</a:t>
+            </a:r>
+          </a:p>
+        </p:txBody>
+      </p:sp>
+      <p:sp>
+        <p:nvSpPr>
+          <p:cNvPr id="3" name="Content Placeholder 2">
+            <a:extLst>
+              <a:ext uri="{FF2B5EF4-FFF2-40B4-BE49-F238E27FC236}">
+                <a16:creationId xmlns:a16="http://schemas.microsoft.com/office/drawing/2014/main" id="{A09D67AF-FF6A-4BC7-8347-8B819F77929B}"/>
+              </a:ext>
+            </a:extLst>
+          </p:cNvPr>
+          <p:cNvSpPr>
+            <a:spLocks noGrp="1"/>
+          </p:cNvSpPr>
+          <p:nvPr>
+            <p:ph sz="quarter" idx="13"/>
+          </p:nvPr>
+        </p:nvSpPr>
+        <p:spPr/>
+        <p:txBody>
+          <a:bodyPr/>
+          <a:lstStyle/>
+          <a:p>
+            <a:r>
+              <a:rPr lang="en-US" dirty="0"/>
+              <a:t>Later, we’ll talk about </a:t>
+            </a:r>
+            <a:r>
+              <a:rPr lang="en-US" b="1" i="1" dirty="0"/>
+              <a:t>ZERO TRUST NETWORKS</a:t>
+            </a:r>
+            <a:endParaRPr lang="en-US" dirty="0"/>
+          </a:p>
+          <a:p>
+            <a:r>
+              <a:rPr lang="en-US" dirty="0"/>
+              <a:t>Many believe that the “Firewall is Dead”, “DMZ’s are Dead”, </a:t>
+            </a:r>
+            <a:r>
+              <a:rPr lang="en-US" dirty="0" err="1"/>
+              <a:t>etc</a:t>
+            </a:r>
+            <a:endParaRPr lang="en-US" dirty="0"/>
+          </a:p>
+          <a:p>
+            <a:r>
+              <a:rPr lang="en-US" dirty="0"/>
+              <a:t>I doubt that they die, but we’ll talk later about how they’re no </a:t>
+            </a:r>
+            <a:r>
+              <a:rPr lang="en-US"/>
+              <a:t>longer enough</a:t>
+            </a:r>
+          </a:p>
+        </p:txBody>
+      </p:sp>
+    </p:spTree>
+    <p:extLst>
+      <p:ext uri="{BB962C8B-B14F-4D97-AF65-F5344CB8AC3E}">
+        <p14:creationId xmlns:p14="http://schemas.microsoft.com/office/powerpoint/2010/main" val="3830593279"/>
       </p:ext>
     </p:extLst>
   </p:cSld>

</xml_diff>